<commit_message>
some hooks added into example
</commit_message>
<xml_diff>
--- a/React & Hooks.pptx
+++ b/React & Hooks.pptx
@@ -5,10 +5,10 @@
     <p:sldMasterId id="2147483648" r:id="rId4"/>
   </p:sldMasterIdLst>
   <p:notesMasterIdLst>
-    <p:notesMasterId r:id="rId21"/>
+    <p:notesMasterId r:id="rId24"/>
   </p:notesMasterIdLst>
   <p:handoutMasterIdLst>
-    <p:handoutMasterId r:id="rId22"/>
+    <p:handoutMasterId r:id="rId25"/>
   </p:handoutMasterIdLst>
   <p:sldIdLst>
     <p:sldId id="256" r:id="rId5"/>
@@ -22,11 +22,14 @@
     <p:sldId id="265" r:id="rId13"/>
     <p:sldId id="3853" r:id="rId14"/>
     <p:sldId id="3854" r:id="rId15"/>
-    <p:sldId id="263" r:id="rId16"/>
-    <p:sldId id="268" r:id="rId17"/>
-    <p:sldId id="3848" r:id="rId18"/>
-    <p:sldId id="267" r:id="rId19"/>
-    <p:sldId id="3847" r:id="rId20"/>
+    <p:sldId id="3855" r:id="rId16"/>
+    <p:sldId id="263" r:id="rId17"/>
+    <p:sldId id="3856" r:id="rId18"/>
+    <p:sldId id="3857" r:id="rId19"/>
+    <p:sldId id="3858" r:id="rId20"/>
+    <p:sldId id="3859" r:id="rId21"/>
+    <p:sldId id="3860" r:id="rId22"/>
+    <p:sldId id="3861" r:id="rId23"/>
   </p:sldIdLst>
   <p:sldSz cx="12192000" cy="6858000"/>
   <p:notesSz cx="6858000" cy="9144000"/>
@@ -141,11 +144,14 @@
             <p14:sldId id="265"/>
             <p14:sldId id="3853"/>
             <p14:sldId id="3854"/>
+            <p14:sldId id="3855"/>
             <p14:sldId id="263"/>
-            <p14:sldId id="268"/>
-            <p14:sldId id="3848"/>
-            <p14:sldId id="267"/>
-            <p14:sldId id="3847"/>
+            <p14:sldId id="3856"/>
+            <p14:sldId id="3857"/>
+            <p14:sldId id="3858"/>
+            <p14:sldId id="3859"/>
+            <p14:sldId id="3860"/>
+            <p14:sldId id="3861"/>
           </p14:sldIdLst>
         </p14:section>
       </p14:sectionLst>
@@ -260,7 +266,7 @@
           <a:p>
             <a:fld id="{0DC994AA-C437-4EF4-8BEF-0B832D7FA420}" type="datetimeFigureOut">
               <a:rPr lang="en-US" smtClean="0"/>
-              <a:t>2/24/2024</a:t>
+              <a:t>2/26/2024</a:t>
             </a:fld>
             <a:endParaRPr lang="en-US" dirty="0"/>
           </a:p>
@@ -437,7 +443,7 @@
           <a:p>
             <a:fld id="{FB20CE03-6C3A-EB4D-A9B1-7EFD38B58412}" type="datetimeFigureOut">
               <a:rPr lang="en-US" smtClean="0"/>
-              <a:t>2/24/2024</a:t>
+              <a:t>2/26/2024</a:t>
             </a:fld>
             <a:endParaRPr lang="en-US" dirty="0"/>
           </a:p>
@@ -1009,7 +1015,13 @@
   <p:cSld>
     <p:spTree>
       <p:nvGrpSpPr>
-        <p:cNvPr id="1" name=""/>
+        <p:cNvPr id="1" name="">
+          <a:extLst>
+            <a:ext uri="{FF2B5EF4-FFF2-40B4-BE49-F238E27FC236}">
+              <a16:creationId xmlns:a16="http://schemas.microsoft.com/office/drawing/2014/main" id="{D593BC26-F882-33DB-45A9-C99954C8107F}"/>
+            </a:ext>
+          </a:extLst>
+        </p:cNvPr>
         <p:cNvGrpSpPr/>
         <p:nvPr/>
       </p:nvGrpSpPr>
@@ -1023,7 +1035,13 @@
       </p:grpSpPr>
       <p:sp>
         <p:nvSpPr>
-          <p:cNvPr id="2" name="Slide Image Placeholder 1"/>
+          <p:cNvPr id="2" name="Slide Image Placeholder 1">
+            <a:extLst>
+              <a:ext uri="{FF2B5EF4-FFF2-40B4-BE49-F238E27FC236}">
+                <a16:creationId xmlns:a16="http://schemas.microsoft.com/office/drawing/2014/main" id="{5514CD85-CD0E-DB8F-432A-FE0EDA32D0DE}"/>
+              </a:ext>
+            </a:extLst>
+          </p:cNvPr>
           <p:cNvSpPr>
             <a:spLocks noGrp="1" noRot="1" noChangeAspect="1"/>
           </p:cNvSpPr>
@@ -1035,7 +1053,13 @@
       </p:sp>
       <p:sp>
         <p:nvSpPr>
-          <p:cNvPr id="3" name="Notes Placeholder 2"/>
+          <p:cNvPr id="3" name="Notes Placeholder 2">
+            <a:extLst>
+              <a:ext uri="{FF2B5EF4-FFF2-40B4-BE49-F238E27FC236}">
+                <a16:creationId xmlns:a16="http://schemas.microsoft.com/office/drawing/2014/main" id="{2BC87C78-CDD5-4AD1-7EC3-FFC247477CB0}"/>
+              </a:ext>
+            </a:extLst>
+          </p:cNvPr>
           <p:cNvSpPr>
             <a:spLocks noGrp="1"/>
           </p:cNvSpPr>
@@ -1054,7 +1078,13 @@
       </p:sp>
       <p:sp>
         <p:nvSpPr>
-          <p:cNvPr id="4" name="Slide Number Placeholder 3"/>
+          <p:cNvPr id="4" name="Slide Number Placeholder 3">
+            <a:extLst>
+              <a:ext uri="{FF2B5EF4-FFF2-40B4-BE49-F238E27FC236}">
+                <a16:creationId xmlns:a16="http://schemas.microsoft.com/office/drawing/2014/main" id="{339903A3-977B-B6D8-842E-84E08F9CEFBF}"/>
+              </a:ext>
+            </a:extLst>
+          </p:cNvPr>
           <p:cNvSpPr>
             <a:spLocks noGrp="1"/>
           </p:cNvSpPr>
@@ -1078,7 +1108,7 @@
     </p:spTree>
     <p:extLst>
       <p:ext uri="{BB962C8B-B14F-4D97-AF65-F5344CB8AC3E}">
-        <p14:creationId xmlns:p14="http://schemas.microsoft.com/office/powerpoint/2010/main" val="2540028172"/>
+        <p14:creationId xmlns:p14="http://schemas.microsoft.com/office/powerpoint/2010/main" val="553441877"/>
       </p:ext>
     </p:extLst>
   </p:cSld>
@@ -1162,7 +1192,7 @@
     </p:spTree>
     <p:extLst>
       <p:ext uri="{BB962C8B-B14F-4D97-AF65-F5344CB8AC3E}">
-        <p14:creationId xmlns:p14="http://schemas.microsoft.com/office/powerpoint/2010/main" val="2316091678"/>
+        <p14:creationId xmlns:p14="http://schemas.microsoft.com/office/powerpoint/2010/main" val="2540028172"/>
       </p:ext>
     </p:extLst>
   </p:cSld>
@@ -1177,7 +1207,13 @@
   <p:cSld>
     <p:spTree>
       <p:nvGrpSpPr>
-        <p:cNvPr id="1" name=""/>
+        <p:cNvPr id="1" name="">
+          <a:extLst>
+            <a:ext uri="{FF2B5EF4-FFF2-40B4-BE49-F238E27FC236}">
+              <a16:creationId xmlns:a16="http://schemas.microsoft.com/office/drawing/2014/main" id="{555F7D5D-873E-494B-E8CD-473D45FC039D}"/>
+            </a:ext>
+          </a:extLst>
+        </p:cNvPr>
         <p:cNvGrpSpPr/>
         <p:nvPr/>
       </p:nvGrpSpPr>
@@ -1191,7 +1227,13 @@
       </p:grpSpPr>
       <p:sp>
         <p:nvSpPr>
-          <p:cNvPr id="2" name="Slide Image Placeholder 1"/>
+          <p:cNvPr id="2" name="Slide Image Placeholder 1">
+            <a:extLst>
+              <a:ext uri="{FF2B5EF4-FFF2-40B4-BE49-F238E27FC236}">
+                <a16:creationId xmlns:a16="http://schemas.microsoft.com/office/drawing/2014/main" id="{435ED397-A25B-6149-EF11-62AC4243D74C}"/>
+              </a:ext>
+            </a:extLst>
+          </p:cNvPr>
           <p:cNvSpPr>
             <a:spLocks noGrp="1" noRot="1" noChangeAspect="1"/>
           </p:cNvSpPr>
@@ -1203,7 +1245,13 @@
       </p:sp>
       <p:sp>
         <p:nvSpPr>
-          <p:cNvPr id="3" name="Notes Placeholder 2"/>
+          <p:cNvPr id="3" name="Notes Placeholder 2">
+            <a:extLst>
+              <a:ext uri="{FF2B5EF4-FFF2-40B4-BE49-F238E27FC236}">
+                <a16:creationId xmlns:a16="http://schemas.microsoft.com/office/drawing/2014/main" id="{1CFF6016-C54B-0611-86F9-E872D78DE1DD}"/>
+              </a:ext>
+            </a:extLst>
+          </p:cNvPr>
           <p:cNvSpPr>
             <a:spLocks noGrp="1"/>
           </p:cNvSpPr>
@@ -1222,7 +1270,13 @@
       </p:sp>
       <p:sp>
         <p:nvSpPr>
-          <p:cNvPr id="4" name="Slide Number Placeholder 3"/>
+          <p:cNvPr id="4" name="Slide Number Placeholder 3">
+            <a:extLst>
+              <a:ext uri="{FF2B5EF4-FFF2-40B4-BE49-F238E27FC236}">
+                <a16:creationId xmlns:a16="http://schemas.microsoft.com/office/drawing/2014/main" id="{5A72EE1F-7230-1D36-3FA6-5505941E39F4}"/>
+              </a:ext>
+            </a:extLst>
+          </p:cNvPr>
           <p:cNvSpPr>
             <a:spLocks noGrp="1"/>
           </p:cNvSpPr>
@@ -1246,7 +1300,7 @@
     </p:spTree>
     <p:extLst>
       <p:ext uri="{BB962C8B-B14F-4D97-AF65-F5344CB8AC3E}">
-        <p14:creationId xmlns:p14="http://schemas.microsoft.com/office/powerpoint/2010/main" val="737681818"/>
+        <p14:creationId xmlns:p14="http://schemas.microsoft.com/office/powerpoint/2010/main" val="523169481"/>
       </p:ext>
     </p:extLst>
   </p:cSld>
@@ -1261,7 +1315,13 @@
   <p:cSld>
     <p:spTree>
       <p:nvGrpSpPr>
-        <p:cNvPr id="1" name=""/>
+        <p:cNvPr id="1" name="">
+          <a:extLst>
+            <a:ext uri="{FF2B5EF4-FFF2-40B4-BE49-F238E27FC236}">
+              <a16:creationId xmlns:a16="http://schemas.microsoft.com/office/drawing/2014/main" id="{B73F0B4F-E319-68C8-FC5F-2C436F7954E2}"/>
+            </a:ext>
+          </a:extLst>
+        </p:cNvPr>
         <p:cNvGrpSpPr/>
         <p:nvPr/>
       </p:nvGrpSpPr>
@@ -1275,7 +1335,13 @@
       </p:grpSpPr>
       <p:sp>
         <p:nvSpPr>
-          <p:cNvPr id="2" name="Slide Image Placeholder 1"/>
+          <p:cNvPr id="2" name="Slide Image Placeholder 1">
+            <a:extLst>
+              <a:ext uri="{FF2B5EF4-FFF2-40B4-BE49-F238E27FC236}">
+                <a16:creationId xmlns:a16="http://schemas.microsoft.com/office/drawing/2014/main" id="{C04F0C1D-ACAE-B715-12F4-A079E84B3063}"/>
+              </a:ext>
+            </a:extLst>
+          </p:cNvPr>
           <p:cNvSpPr>
             <a:spLocks noGrp="1" noRot="1" noChangeAspect="1"/>
           </p:cNvSpPr>
@@ -1287,7 +1353,13 @@
       </p:sp>
       <p:sp>
         <p:nvSpPr>
-          <p:cNvPr id="3" name="Notes Placeholder 2"/>
+          <p:cNvPr id="3" name="Notes Placeholder 2">
+            <a:extLst>
+              <a:ext uri="{FF2B5EF4-FFF2-40B4-BE49-F238E27FC236}">
+                <a16:creationId xmlns:a16="http://schemas.microsoft.com/office/drawing/2014/main" id="{A166EDC7-79F7-E6E4-70EB-1BAA02D0BFCD}"/>
+              </a:ext>
+            </a:extLst>
+          </p:cNvPr>
           <p:cNvSpPr>
             <a:spLocks noGrp="1"/>
           </p:cNvSpPr>
@@ -1306,7 +1378,13 @@
       </p:sp>
       <p:sp>
         <p:nvSpPr>
-          <p:cNvPr id="4" name="Slide Number Placeholder 3"/>
+          <p:cNvPr id="4" name="Slide Number Placeholder 3">
+            <a:extLst>
+              <a:ext uri="{FF2B5EF4-FFF2-40B4-BE49-F238E27FC236}">
+                <a16:creationId xmlns:a16="http://schemas.microsoft.com/office/drawing/2014/main" id="{9FCF0FE3-6131-63EC-09E2-E4008AD4A4D5}"/>
+              </a:ext>
+            </a:extLst>
+          </p:cNvPr>
           <p:cNvSpPr>
             <a:spLocks noGrp="1"/>
           </p:cNvSpPr>
@@ -1330,7 +1408,7 @@
     </p:spTree>
     <p:extLst>
       <p:ext uri="{BB962C8B-B14F-4D97-AF65-F5344CB8AC3E}">
-        <p14:creationId xmlns:p14="http://schemas.microsoft.com/office/powerpoint/2010/main" val="3206739456"/>
+        <p14:creationId xmlns:p14="http://schemas.microsoft.com/office/powerpoint/2010/main" val="445080971"/>
       </p:ext>
     </p:extLst>
   </p:cSld>
@@ -1345,7 +1423,13 @@
   <p:cSld>
     <p:spTree>
       <p:nvGrpSpPr>
-        <p:cNvPr id="1" name=""/>
+        <p:cNvPr id="1" name="">
+          <a:extLst>
+            <a:ext uri="{FF2B5EF4-FFF2-40B4-BE49-F238E27FC236}">
+              <a16:creationId xmlns:a16="http://schemas.microsoft.com/office/drawing/2014/main" id="{D196D372-D88B-254F-F242-93BE52F60E9A}"/>
+            </a:ext>
+          </a:extLst>
+        </p:cNvPr>
         <p:cNvGrpSpPr/>
         <p:nvPr/>
       </p:nvGrpSpPr>
@@ -1359,7 +1443,13 @@
       </p:grpSpPr>
       <p:sp>
         <p:nvSpPr>
-          <p:cNvPr id="2" name="Slide Image Placeholder 1"/>
+          <p:cNvPr id="2" name="Slide Image Placeholder 1">
+            <a:extLst>
+              <a:ext uri="{FF2B5EF4-FFF2-40B4-BE49-F238E27FC236}">
+                <a16:creationId xmlns:a16="http://schemas.microsoft.com/office/drawing/2014/main" id="{DC338B36-DFFC-469C-1B96-D1659CDFF08C}"/>
+              </a:ext>
+            </a:extLst>
+          </p:cNvPr>
           <p:cNvSpPr>
             <a:spLocks noGrp="1" noRot="1" noChangeAspect="1"/>
           </p:cNvSpPr>
@@ -1371,7 +1461,13 @@
       </p:sp>
       <p:sp>
         <p:nvSpPr>
-          <p:cNvPr id="3" name="Notes Placeholder 2"/>
+          <p:cNvPr id="3" name="Notes Placeholder 2">
+            <a:extLst>
+              <a:ext uri="{FF2B5EF4-FFF2-40B4-BE49-F238E27FC236}">
+                <a16:creationId xmlns:a16="http://schemas.microsoft.com/office/drawing/2014/main" id="{12E95DB7-F55B-54F2-4C84-D5D5C8E53163}"/>
+              </a:ext>
+            </a:extLst>
+          </p:cNvPr>
           <p:cNvSpPr>
             <a:spLocks noGrp="1"/>
           </p:cNvSpPr>
@@ -1390,7 +1486,13 @@
       </p:sp>
       <p:sp>
         <p:nvSpPr>
-          <p:cNvPr id="4" name="Slide Number Placeholder 3"/>
+          <p:cNvPr id="4" name="Slide Number Placeholder 3">
+            <a:extLst>
+              <a:ext uri="{FF2B5EF4-FFF2-40B4-BE49-F238E27FC236}">
+                <a16:creationId xmlns:a16="http://schemas.microsoft.com/office/drawing/2014/main" id="{46F000B0-5D69-A68C-8D45-880D5F88E096}"/>
+              </a:ext>
+            </a:extLst>
+          </p:cNvPr>
           <p:cNvSpPr>
             <a:spLocks noGrp="1"/>
           </p:cNvSpPr>
@@ -1414,7 +1516,331 @@
     </p:spTree>
     <p:extLst>
       <p:ext uri="{BB962C8B-B14F-4D97-AF65-F5344CB8AC3E}">
-        <p14:creationId xmlns:p14="http://schemas.microsoft.com/office/powerpoint/2010/main" val="4151229091"/>
+        <p14:creationId xmlns:p14="http://schemas.microsoft.com/office/powerpoint/2010/main" val="3681240857"/>
+      </p:ext>
+    </p:extLst>
+  </p:cSld>
+  <p:clrMapOvr>
+    <a:masterClrMapping/>
+  </p:clrMapOvr>
+</p:notes>
+</file>
+
+<file path=ppt/notesSlides/notesSlide17.xml><?xml version="1.0" encoding="utf-8"?>
+<p:notes xmlns:a="http://schemas.openxmlformats.org/drawingml/2006/main" xmlns:r="http://schemas.openxmlformats.org/officeDocument/2006/relationships" xmlns:p="http://schemas.openxmlformats.org/presentationml/2006/main">
+  <p:cSld>
+    <p:spTree>
+      <p:nvGrpSpPr>
+        <p:cNvPr id="1" name="">
+          <a:extLst>
+            <a:ext uri="{FF2B5EF4-FFF2-40B4-BE49-F238E27FC236}">
+              <a16:creationId xmlns:a16="http://schemas.microsoft.com/office/drawing/2014/main" id="{C3C82B46-7DE8-FB19-2239-2174E61325D2}"/>
+            </a:ext>
+          </a:extLst>
+        </p:cNvPr>
+        <p:cNvGrpSpPr/>
+        <p:nvPr/>
+      </p:nvGrpSpPr>
+      <p:grpSpPr>
+        <a:xfrm>
+          <a:off x="0" y="0"/>
+          <a:ext cx="0" cy="0"/>
+          <a:chOff x="0" y="0"/>
+          <a:chExt cx="0" cy="0"/>
+        </a:xfrm>
+      </p:grpSpPr>
+      <p:sp>
+        <p:nvSpPr>
+          <p:cNvPr id="2" name="Slide Image Placeholder 1">
+            <a:extLst>
+              <a:ext uri="{FF2B5EF4-FFF2-40B4-BE49-F238E27FC236}">
+                <a16:creationId xmlns:a16="http://schemas.microsoft.com/office/drawing/2014/main" id="{E07DC8D4-D488-0DB5-CCC1-EF3C5AE8E89B}"/>
+              </a:ext>
+            </a:extLst>
+          </p:cNvPr>
+          <p:cNvSpPr>
+            <a:spLocks noGrp="1" noRot="1" noChangeAspect="1"/>
+          </p:cNvSpPr>
+          <p:nvPr>
+            <p:ph type="sldImg"/>
+          </p:nvPr>
+        </p:nvSpPr>
+        <p:spPr/>
+      </p:sp>
+      <p:sp>
+        <p:nvSpPr>
+          <p:cNvPr id="3" name="Notes Placeholder 2">
+            <a:extLst>
+              <a:ext uri="{FF2B5EF4-FFF2-40B4-BE49-F238E27FC236}">
+                <a16:creationId xmlns:a16="http://schemas.microsoft.com/office/drawing/2014/main" id="{8A6F8E10-4FFA-606D-DCE6-5E734D8616DC}"/>
+              </a:ext>
+            </a:extLst>
+          </p:cNvPr>
+          <p:cNvSpPr>
+            <a:spLocks noGrp="1"/>
+          </p:cNvSpPr>
+          <p:nvPr>
+            <p:ph type="body" idx="1"/>
+          </p:nvPr>
+        </p:nvSpPr>
+        <p:spPr/>
+        <p:txBody>
+          <a:bodyPr/>
+          <a:lstStyle/>
+          <a:p>
+            <a:endParaRPr lang="en-US" dirty="0"/>
+          </a:p>
+        </p:txBody>
+      </p:sp>
+      <p:sp>
+        <p:nvSpPr>
+          <p:cNvPr id="4" name="Slide Number Placeholder 3">
+            <a:extLst>
+              <a:ext uri="{FF2B5EF4-FFF2-40B4-BE49-F238E27FC236}">
+                <a16:creationId xmlns:a16="http://schemas.microsoft.com/office/drawing/2014/main" id="{4D2A23A2-BC58-A7F1-DD0E-64D3B54027AF}"/>
+              </a:ext>
+            </a:extLst>
+          </p:cNvPr>
+          <p:cNvSpPr>
+            <a:spLocks noGrp="1"/>
+          </p:cNvSpPr>
+          <p:nvPr>
+            <p:ph type="sldNum" sz="quarter" idx="5"/>
+          </p:nvPr>
+        </p:nvSpPr>
+        <p:spPr/>
+        <p:txBody>
+          <a:bodyPr/>
+          <a:lstStyle/>
+          <a:p>
+            <a:fld id="{8B57D50D-BAA9-464B-B391-243138E078D8}" type="slidenum">
+              <a:rPr lang="en-US" smtClean="0"/>
+              <a:t>17</a:t>
+            </a:fld>
+            <a:endParaRPr lang="en-US" dirty="0"/>
+          </a:p>
+        </p:txBody>
+      </p:sp>
+    </p:spTree>
+    <p:extLst>
+      <p:ext uri="{BB962C8B-B14F-4D97-AF65-F5344CB8AC3E}">
+        <p14:creationId xmlns:p14="http://schemas.microsoft.com/office/powerpoint/2010/main" val="1168111747"/>
+      </p:ext>
+    </p:extLst>
+  </p:cSld>
+  <p:clrMapOvr>
+    <a:masterClrMapping/>
+  </p:clrMapOvr>
+</p:notes>
+</file>
+
+<file path=ppt/notesSlides/notesSlide18.xml><?xml version="1.0" encoding="utf-8"?>
+<p:notes xmlns:a="http://schemas.openxmlformats.org/drawingml/2006/main" xmlns:r="http://schemas.openxmlformats.org/officeDocument/2006/relationships" xmlns:p="http://schemas.openxmlformats.org/presentationml/2006/main">
+  <p:cSld>
+    <p:spTree>
+      <p:nvGrpSpPr>
+        <p:cNvPr id="1" name="">
+          <a:extLst>
+            <a:ext uri="{FF2B5EF4-FFF2-40B4-BE49-F238E27FC236}">
+              <a16:creationId xmlns:a16="http://schemas.microsoft.com/office/drawing/2014/main" id="{BF771CAD-5D83-7783-8721-605CAE5BFEE2}"/>
+            </a:ext>
+          </a:extLst>
+        </p:cNvPr>
+        <p:cNvGrpSpPr/>
+        <p:nvPr/>
+      </p:nvGrpSpPr>
+      <p:grpSpPr>
+        <a:xfrm>
+          <a:off x="0" y="0"/>
+          <a:ext cx="0" cy="0"/>
+          <a:chOff x="0" y="0"/>
+          <a:chExt cx="0" cy="0"/>
+        </a:xfrm>
+      </p:grpSpPr>
+      <p:sp>
+        <p:nvSpPr>
+          <p:cNvPr id="2" name="Slide Image Placeholder 1">
+            <a:extLst>
+              <a:ext uri="{FF2B5EF4-FFF2-40B4-BE49-F238E27FC236}">
+                <a16:creationId xmlns:a16="http://schemas.microsoft.com/office/drawing/2014/main" id="{3801C2AC-92FE-587A-CDE8-5A01FE2640F3}"/>
+              </a:ext>
+            </a:extLst>
+          </p:cNvPr>
+          <p:cNvSpPr>
+            <a:spLocks noGrp="1" noRot="1" noChangeAspect="1"/>
+          </p:cNvSpPr>
+          <p:nvPr>
+            <p:ph type="sldImg"/>
+          </p:nvPr>
+        </p:nvSpPr>
+        <p:spPr/>
+      </p:sp>
+      <p:sp>
+        <p:nvSpPr>
+          <p:cNvPr id="3" name="Notes Placeholder 2">
+            <a:extLst>
+              <a:ext uri="{FF2B5EF4-FFF2-40B4-BE49-F238E27FC236}">
+                <a16:creationId xmlns:a16="http://schemas.microsoft.com/office/drawing/2014/main" id="{2348C6C4-2122-3880-0F16-B6825B57AB07}"/>
+              </a:ext>
+            </a:extLst>
+          </p:cNvPr>
+          <p:cNvSpPr>
+            <a:spLocks noGrp="1"/>
+          </p:cNvSpPr>
+          <p:nvPr>
+            <p:ph type="body" idx="1"/>
+          </p:nvPr>
+        </p:nvSpPr>
+        <p:spPr/>
+        <p:txBody>
+          <a:bodyPr/>
+          <a:lstStyle/>
+          <a:p>
+            <a:endParaRPr lang="en-US" dirty="0"/>
+          </a:p>
+        </p:txBody>
+      </p:sp>
+      <p:sp>
+        <p:nvSpPr>
+          <p:cNvPr id="4" name="Slide Number Placeholder 3">
+            <a:extLst>
+              <a:ext uri="{FF2B5EF4-FFF2-40B4-BE49-F238E27FC236}">
+                <a16:creationId xmlns:a16="http://schemas.microsoft.com/office/drawing/2014/main" id="{A28102F6-3161-1707-3677-29CD3A468AA3}"/>
+              </a:ext>
+            </a:extLst>
+          </p:cNvPr>
+          <p:cNvSpPr>
+            <a:spLocks noGrp="1"/>
+          </p:cNvSpPr>
+          <p:nvPr>
+            <p:ph type="sldNum" sz="quarter" idx="5"/>
+          </p:nvPr>
+        </p:nvSpPr>
+        <p:spPr/>
+        <p:txBody>
+          <a:bodyPr/>
+          <a:lstStyle/>
+          <a:p>
+            <a:fld id="{8B57D50D-BAA9-464B-B391-243138E078D8}" type="slidenum">
+              <a:rPr lang="en-US" smtClean="0"/>
+              <a:t>18</a:t>
+            </a:fld>
+            <a:endParaRPr lang="en-US" dirty="0"/>
+          </a:p>
+        </p:txBody>
+      </p:sp>
+    </p:spTree>
+    <p:extLst>
+      <p:ext uri="{BB962C8B-B14F-4D97-AF65-F5344CB8AC3E}">
+        <p14:creationId xmlns:p14="http://schemas.microsoft.com/office/powerpoint/2010/main" val="2346880942"/>
+      </p:ext>
+    </p:extLst>
+  </p:cSld>
+  <p:clrMapOvr>
+    <a:masterClrMapping/>
+  </p:clrMapOvr>
+</p:notes>
+</file>
+
+<file path=ppt/notesSlides/notesSlide19.xml><?xml version="1.0" encoding="utf-8"?>
+<p:notes xmlns:a="http://schemas.openxmlformats.org/drawingml/2006/main" xmlns:r="http://schemas.openxmlformats.org/officeDocument/2006/relationships" xmlns:p="http://schemas.openxmlformats.org/presentationml/2006/main">
+  <p:cSld>
+    <p:spTree>
+      <p:nvGrpSpPr>
+        <p:cNvPr id="1" name="">
+          <a:extLst>
+            <a:ext uri="{FF2B5EF4-FFF2-40B4-BE49-F238E27FC236}">
+              <a16:creationId xmlns:a16="http://schemas.microsoft.com/office/drawing/2014/main" id="{B0505F05-374F-2B18-DFA5-881DAC81B7AC}"/>
+            </a:ext>
+          </a:extLst>
+        </p:cNvPr>
+        <p:cNvGrpSpPr/>
+        <p:nvPr/>
+      </p:nvGrpSpPr>
+      <p:grpSpPr>
+        <a:xfrm>
+          <a:off x="0" y="0"/>
+          <a:ext cx="0" cy="0"/>
+          <a:chOff x="0" y="0"/>
+          <a:chExt cx="0" cy="0"/>
+        </a:xfrm>
+      </p:grpSpPr>
+      <p:sp>
+        <p:nvSpPr>
+          <p:cNvPr id="2" name="Slide Image Placeholder 1">
+            <a:extLst>
+              <a:ext uri="{FF2B5EF4-FFF2-40B4-BE49-F238E27FC236}">
+                <a16:creationId xmlns:a16="http://schemas.microsoft.com/office/drawing/2014/main" id="{C8AF5CD7-FB18-39F2-9824-9D9D7A36B0B7}"/>
+              </a:ext>
+            </a:extLst>
+          </p:cNvPr>
+          <p:cNvSpPr>
+            <a:spLocks noGrp="1" noRot="1" noChangeAspect="1"/>
+          </p:cNvSpPr>
+          <p:nvPr>
+            <p:ph type="sldImg"/>
+          </p:nvPr>
+        </p:nvSpPr>
+        <p:spPr/>
+      </p:sp>
+      <p:sp>
+        <p:nvSpPr>
+          <p:cNvPr id="3" name="Notes Placeholder 2">
+            <a:extLst>
+              <a:ext uri="{FF2B5EF4-FFF2-40B4-BE49-F238E27FC236}">
+                <a16:creationId xmlns:a16="http://schemas.microsoft.com/office/drawing/2014/main" id="{CEB442E5-44A2-38D7-F5FD-26150D75CE29}"/>
+              </a:ext>
+            </a:extLst>
+          </p:cNvPr>
+          <p:cNvSpPr>
+            <a:spLocks noGrp="1"/>
+          </p:cNvSpPr>
+          <p:nvPr>
+            <p:ph type="body" idx="1"/>
+          </p:nvPr>
+        </p:nvSpPr>
+        <p:spPr/>
+        <p:txBody>
+          <a:bodyPr/>
+          <a:lstStyle/>
+          <a:p>
+            <a:endParaRPr lang="en-US" dirty="0"/>
+          </a:p>
+        </p:txBody>
+      </p:sp>
+      <p:sp>
+        <p:nvSpPr>
+          <p:cNvPr id="4" name="Slide Number Placeholder 3">
+            <a:extLst>
+              <a:ext uri="{FF2B5EF4-FFF2-40B4-BE49-F238E27FC236}">
+                <a16:creationId xmlns:a16="http://schemas.microsoft.com/office/drawing/2014/main" id="{8EC0C197-B26B-C249-6B7A-5543724D24C7}"/>
+              </a:ext>
+            </a:extLst>
+          </p:cNvPr>
+          <p:cNvSpPr>
+            <a:spLocks noGrp="1"/>
+          </p:cNvSpPr>
+          <p:nvPr>
+            <p:ph type="sldNum" sz="quarter" idx="5"/>
+          </p:nvPr>
+        </p:nvSpPr>
+        <p:spPr/>
+        <p:txBody>
+          <a:bodyPr/>
+          <a:lstStyle/>
+          <a:p>
+            <a:fld id="{8B57D50D-BAA9-464B-B391-243138E078D8}" type="slidenum">
+              <a:rPr lang="en-US" smtClean="0"/>
+              <a:t>19</a:t>
+            </a:fld>
+            <a:endParaRPr lang="en-US" dirty="0"/>
+          </a:p>
+        </p:txBody>
+      </p:sp>
+    </p:spTree>
+    <p:extLst>
+      <p:ext uri="{BB962C8B-B14F-4D97-AF65-F5344CB8AC3E}">
+        <p14:creationId xmlns:p14="http://schemas.microsoft.com/office/powerpoint/2010/main" val="3166380795"/>
       </p:ext>
     </p:extLst>
   </p:cSld>
@@ -3803,7 +4229,7 @@
           <a:p>
             <a:fld id="{D6D8061D-18C3-4F4F-85EF-561633F58754}" type="datetimeFigureOut">
               <a:rPr lang="en-US" smtClean="0"/>
-              <a:t>2/24/2024</a:t>
+              <a:t>2/26/2024</a:t>
             </a:fld>
             <a:endParaRPr lang="en-US" dirty="0"/>
           </a:p>
@@ -4489,7 +4915,7 @@
           <a:p>
             <a:fld id="{D6D8061D-18C3-4F4F-85EF-561633F58754}" type="datetimeFigureOut">
               <a:rPr lang="en-US" smtClean="0"/>
-              <a:t>2/24/2024</a:t>
+              <a:t>2/26/2024</a:t>
             </a:fld>
             <a:endParaRPr lang="en-US" dirty="0"/>
           </a:p>
@@ -4632,7 +5058,7 @@
           <a:p>
             <a:fld id="{D6D8061D-18C3-4F4F-85EF-561633F58754}" type="datetimeFigureOut">
               <a:rPr lang="en-US" smtClean="0"/>
-              <a:t>2/24/2024</a:t>
+              <a:t>2/26/2024</a:t>
             </a:fld>
             <a:endParaRPr lang="en-US" dirty="0"/>
           </a:p>
@@ -5777,7 +6203,7 @@
           <a:p>
             <a:fld id="{D6D8061D-18C3-4F4F-85EF-561633F58754}" type="datetimeFigureOut">
               <a:rPr lang="en-US" smtClean="0"/>
-              <a:t>2/24/2024</a:t>
+              <a:t>2/26/2024</a:t>
             </a:fld>
             <a:endParaRPr lang="en-US" dirty="0"/>
           </a:p>
@@ -8065,7 +8491,7 @@
           <a:p>
             <a:fld id="{D6D8061D-18C3-4F4F-85EF-561633F58754}" type="datetimeFigureOut">
               <a:rPr lang="en-US" smtClean="0"/>
-              <a:t>2/24/2024</a:t>
+              <a:t>2/26/2024</a:t>
             </a:fld>
             <a:endParaRPr lang="en-US" dirty="0"/>
           </a:p>
@@ -9335,7 +9761,7 @@
           <a:p>
             <a:fld id="{D6D8061D-18C3-4F4F-85EF-561633F58754}" type="datetimeFigureOut">
               <a:rPr lang="en-US" smtClean="0"/>
-              <a:t>2/24/2024</a:t>
+              <a:t>2/26/2024</a:t>
             </a:fld>
             <a:endParaRPr lang="en-US" dirty="0"/>
           </a:p>
@@ -10400,7 +10826,7 @@
           <a:p>
             <a:fld id="{D6D8061D-18C3-4F4F-85EF-561633F58754}" type="datetimeFigureOut">
               <a:rPr lang="en-US" smtClean="0"/>
-              <a:t>2/24/2024</a:t>
+              <a:t>2/26/2024</a:t>
             </a:fld>
             <a:endParaRPr lang="en-US" dirty="0"/>
           </a:p>
@@ -10809,7 +11235,7 @@
           <a:p>
             <a:fld id="{D6D8061D-18C3-4F4F-85EF-561633F58754}" type="datetimeFigureOut">
               <a:rPr lang="en-US" smtClean="0"/>
-              <a:t>2/24/2024</a:t>
+              <a:t>2/26/2024</a:t>
             </a:fld>
             <a:endParaRPr lang="en-US" dirty="0"/>
           </a:p>
@@ -11780,7 +12206,7 @@
           <a:p>
             <a:fld id="{D6D8061D-18C3-4F4F-85EF-561633F58754}" type="datetimeFigureOut">
               <a:rPr lang="en-US" smtClean="0"/>
-              <a:t>2/24/2024</a:t>
+              <a:t>2/26/2024</a:t>
             </a:fld>
             <a:endParaRPr lang="en-US" dirty="0"/>
           </a:p>
@@ -12021,7 +12447,7 @@
           <a:p>
             <a:fld id="{D6D8061D-18C3-4F4F-85EF-561633F58754}" type="datetimeFigureOut">
               <a:rPr lang="en-US" smtClean="0"/>
-              <a:t>2/24/2024</a:t>
+              <a:t>2/26/2024</a:t>
             </a:fld>
             <a:endParaRPr lang="en-US" dirty="0"/>
           </a:p>
@@ -12704,7 +13130,7 @@
           <a:p>
             <a:r>
               <a:rPr lang="en-US" dirty="0"/>
-              <a:t>Experimental and newly added hooks</a:t>
+              <a:t>Experimental and rarely used hooks</a:t>
             </a:r>
           </a:p>
         </p:txBody>
@@ -12737,6 +13163,57 @@
             <a:normAutofit/>
           </a:bodyPr>
           <a:lstStyle/>
+          <a:p>
+            <a:r>
+              <a:rPr lang="en-US" sz="3200" dirty="0"/>
+              <a:t>use() - experimental</a:t>
+            </a:r>
+          </a:p>
+          <a:p>
+            <a:r>
+              <a:rPr lang="en-US" sz="3200" dirty="0" err="1"/>
+              <a:t>useImerativeHandle</a:t>
+            </a:r>
+            <a:r>
+              <a:rPr lang="en-US" sz="3200" dirty="0"/>
+              <a:t>()</a:t>
+            </a:r>
+          </a:p>
+          <a:p>
+            <a:r>
+              <a:rPr lang="en-US" sz="3200" dirty="0" err="1"/>
+              <a:t>useInsertionEffect</a:t>
+            </a:r>
+            <a:r>
+              <a:rPr lang="en-US" sz="3200" dirty="0"/>
+              <a:t>()</a:t>
+            </a:r>
+          </a:p>
+          <a:p>
+            <a:r>
+              <a:rPr lang="en-US" sz="3200" dirty="0" err="1"/>
+              <a:t>useSyncExternalStore</a:t>
+            </a:r>
+            <a:r>
+              <a:rPr lang="en-US" sz="3200" dirty="0"/>
+              <a:t>()</a:t>
+            </a:r>
+          </a:p>
+          <a:p>
+            <a:endParaRPr lang="en-US" sz="3200" dirty="0"/>
+          </a:p>
+          <a:p>
+            <a:endParaRPr lang="en-US" sz="3200" dirty="0"/>
+          </a:p>
+          <a:p>
+            <a:endParaRPr lang="en-US" sz="3200" dirty="0"/>
+          </a:p>
+          <a:p>
+            <a:endParaRPr lang="en-US" sz="3200" dirty="0"/>
+          </a:p>
+          <a:p>
+            <a:endParaRPr lang="en-US" sz="3200" dirty="0"/>
+          </a:p>
           <a:p>
             <a:endParaRPr lang="en-US" sz="3200" dirty="0"/>
           </a:p>
@@ -12760,7 +13237,13 @@
   <p:cSld>
     <p:spTree>
       <p:nvGrpSpPr>
-        <p:cNvPr id="1" name=""/>
+        <p:cNvPr id="1" name="">
+          <a:extLst>
+            <a:ext uri="{FF2B5EF4-FFF2-40B4-BE49-F238E27FC236}">
+              <a16:creationId xmlns:a16="http://schemas.microsoft.com/office/drawing/2014/main" id="{9ADD7277-EEE6-C515-E284-33A500C8285A}"/>
+            </a:ext>
+          </a:extLst>
+        </p:cNvPr>
         <p:cNvGrpSpPr/>
         <p:nvPr/>
       </p:nvGrpSpPr>
@@ -12777,7 +13260,7 @@
           <p:cNvPr id="2" name="Title 1">
             <a:extLst>
               <a:ext uri="{FF2B5EF4-FFF2-40B4-BE49-F238E27FC236}">
-                <a16:creationId xmlns:a16="http://schemas.microsoft.com/office/drawing/2014/main" id="{338A15DE-D135-0710-9984-A0A55E960CB0}"/>
+                <a16:creationId xmlns:a16="http://schemas.microsoft.com/office/drawing/2014/main" id="{C4B387E1-CC97-B525-1277-FB7022AA93FA}"/>
               </a:ext>
             </a:extLst>
           </p:cNvPr>
@@ -12785,107 +13268,31 @@
             <a:spLocks noGrp="1"/>
           </p:cNvSpPr>
           <p:nvPr>
-            <p:ph type="title"/>
+            <p:ph type="ctrTitle"/>
           </p:nvPr>
         </p:nvSpPr>
         <p:spPr>
           <a:xfrm>
-            <a:off x="838200" y="198437"/>
-            <a:ext cx="5257800" cy="2324046"/>
+            <a:off x="2815929" y="1897425"/>
+            <a:ext cx="6560142" cy="3063149"/>
           </a:xfrm>
           <a:noFill/>
         </p:spPr>
         <p:txBody>
-          <a:bodyPr anchor="b"/>
+          <a:bodyPr/>
           <a:lstStyle/>
           <a:p>
             <a:r>
-              <a:rPr lang="en-US" dirty="0"/>
-              <a:t>Speaking impact</a:t>
+              <a:rPr lang="en-US" sz="8000" dirty="0"/>
+              <a:t>Custom Hooks</a:t>
             </a:r>
           </a:p>
         </p:txBody>
       </p:sp>
-      <p:sp>
-        <p:nvSpPr>
-          <p:cNvPr id="3" name="Content Placeholder 2">
-            <a:extLst>
-              <a:ext uri="{FF2B5EF4-FFF2-40B4-BE49-F238E27FC236}">
-                <a16:creationId xmlns:a16="http://schemas.microsoft.com/office/drawing/2014/main" id="{ECC8AA23-D8D0-93BE-5C5F-103A750B0D2F}"/>
-              </a:ext>
-            </a:extLst>
-          </p:cNvPr>
-          <p:cNvSpPr>
-            <a:spLocks noGrp="1"/>
-          </p:cNvSpPr>
-          <p:nvPr>
-            <p:ph sz="half" idx="1"/>
-          </p:nvPr>
-        </p:nvSpPr>
-        <p:spPr>
-          <a:xfrm>
-            <a:off x="838200" y="2657316"/>
-            <a:ext cx="5257800" cy="3369858"/>
-          </a:xfrm>
-          <a:noFill/>
-        </p:spPr>
-        <p:txBody>
-          <a:bodyPr vert="horz" lIns="91440" tIns="45720" rIns="91440" bIns="45720" rtlCol="0" anchor="t">
-            <a:normAutofit/>
-          </a:bodyPr>
-          <a:lstStyle/>
-          <a:p>
-            <a:r>
-              <a:rPr lang="en-US" dirty="0"/>
-              <a:t>Your ability to communicate effectively will leave a lasting impact on your audience</a:t>
-            </a:r>
-          </a:p>
-          <a:p>
-            <a:r>
-              <a:rPr lang="en-US" dirty="0"/>
-              <a:t>Effectively communicating involves not only delivering a message but also resonating with the experiences, values, and emotions of those listening </a:t>
-            </a:r>
-          </a:p>
-        </p:txBody>
-      </p:sp>
-      <p:pic>
-        <p:nvPicPr>
-          <p:cNvPr id="11" name="Picture Placeholder 13" descr="Kids playing and drawing on the ground">
-            <a:extLst>
-              <a:ext uri="{FF2B5EF4-FFF2-40B4-BE49-F238E27FC236}">
-                <a16:creationId xmlns:a16="http://schemas.microsoft.com/office/drawing/2014/main" id="{1505EF47-21F0-359C-67AF-1DE6EA73D605}"/>
-              </a:ext>
-            </a:extLst>
-          </p:cNvPr>
-          <p:cNvPicPr>
-            <a:picLocks noGrp="1" noChangeAspect="1"/>
-          </p:cNvPicPr>
-          <p:nvPr>
-            <p:ph type="pic" sz="quarter" idx="13"/>
-          </p:nvPr>
-        </p:nvPicPr>
-        <p:blipFill>
-          <a:blip r:embed="rId3" cstate="email">
-            <a:extLst>
-              <a:ext uri="{28A0092B-C50C-407E-A947-70E740481C1C}">
-                <a14:useLocalDpi xmlns:a14="http://schemas.microsoft.com/office/drawing/2010/main"/>
-              </a:ext>
-            </a:extLst>
-          </a:blip>
-          <a:srcRect l="15" r="15"/>
-          <a:stretch/>
-        </p:blipFill>
-        <p:spPr>
-          <a:xfrm>
-            <a:off x="6413114" y="845068"/>
-            <a:ext cx="5193792" cy="5193792"/>
-          </a:xfrm>
-        </p:spPr>
-      </p:pic>
     </p:spTree>
     <p:extLst>
       <p:ext uri="{BB962C8B-B14F-4D97-AF65-F5344CB8AC3E}">
-        <p14:creationId xmlns:p14="http://schemas.microsoft.com/office/powerpoint/2010/main" val="2737241225"/>
+        <p14:creationId xmlns:p14="http://schemas.microsoft.com/office/powerpoint/2010/main" val="242652207"/>
       </p:ext>
     </p:extLst>
   </p:cSld>
@@ -12917,7 +13324,7 @@
           <p:cNvPr id="2" name="Title 1">
             <a:extLst>
               <a:ext uri="{FF2B5EF4-FFF2-40B4-BE49-F238E27FC236}">
-                <a16:creationId xmlns:a16="http://schemas.microsoft.com/office/drawing/2014/main" id="{B7545968-70F7-0180-6448-3547E442EF4A}"/>
+                <a16:creationId xmlns:a16="http://schemas.microsoft.com/office/drawing/2014/main" id="{338A15DE-D135-0710-9984-A0A55E960CB0}"/>
               </a:ext>
             </a:extLst>
           </p:cNvPr>
@@ -12930,30 +13337,29 @@
         </p:nvSpPr>
         <p:spPr>
           <a:xfrm>
-            <a:off x="838200" y="365125"/>
-            <a:ext cx="10515600" cy="1325563"/>
+            <a:off x="838200" y="198437"/>
+            <a:ext cx="5257800" cy="2324046"/>
           </a:xfrm>
           <a:noFill/>
         </p:spPr>
         <p:txBody>
-          <a:bodyPr anchor="ctr">
-            <a:noAutofit/>
-          </a:bodyPr>
+          <a:bodyPr anchor="b"/>
           <a:lstStyle/>
           <a:p>
             <a:r>
-              <a:rPr lang="en-US" dirty="0"/>
-              <a:t>Dynamic delivery</a:t>
-            </a:r>
+              <a:rPr lang="en-US"/>
+              <a:t>Custom hooks</a:t>
+            </a:r>
+            <a:endParaRPr lang="en-US" dirty="0"/>
           </a:p>
         </p:txBody>
       </p:sp>
       <p:sp>
         <p:nvSpPr>
-          <p:cNvPr id="8" name="Content Placeholder 7">
+          <p:cNvPr id="3" name="Content Placeholder 2">
             <a:extLst>
               <a:ext uri="{FF2B5EF4-FFF2-40B4-BE49-F238E27FC236}">
-                <a16:creationId xmlns:a16="http://schemas.microsoft.com/office/drawing/2014/main" id="{215CE58D-2739-522B-7C3A-6A7C985360C0}"/>
+                <a16:creationId xmlns:a16="http://schemas.microsoft.com/office/drawing/2014/main" id="{ECC8AA23-D8D0-93BE-5C5F-103A750B0D2F}"/>
               </a:ext>
             </a:extLst>
           </p:cNvPr>
@@ -12966,8 +13372,8 @@
         </p:nvSpPr>
         <p:spPr>
           <a:xfrm>
-            <a:off x="838200" y="1825625"/>
-            <a:ext cx="2882462" cy="4297678"/>
+            <a:off x="838199" y="2657316"/>
+            <a:ext cx="10700657" cy="3369858"/>
           </a:xfrm>
           <a:noFill/>
         </p:spPr>
@@ -12978,513 +13384,19 @@
           <a:lstStyle/>
           <a:p>
             <a:r>
-              <a:rPr lang="en-US" dirty="0"/>
-              <a:t>Learn to infuse energy into your delivery to leave a lasting impression</a:t>
-            </a:r>
-          </a:p>
-          <a:p>
-            <a:r>
-              <a:rPr lang="en-US" dirty="0"/>
-              <a:t>One of the goals of effective communication is to motivate your audience</a:t>
-            </a:r>
+              <a:rPr lang="en-US" sz="2800" dirty="0"/>
+              <a:t>Hooks are nothing but JSX functions at core , with same logic we can create our own hooks . This custom hooks are react functional components which is where we can use other hooks to get desired functionality.</a:t>
+            </a:r>
+          </a:p>
+          <a:p>
+            <a:endParaRPr lang="en-US" sz="2800" dirty="0"/>
           </a:p>
         </p:txBody>
       </p:sp>
-      <p:graphicFrame>
-        <p:nvGraphicFramePr>
-          <p:cNvPr id="3" name="Table Placeholder 2">
-            <a:extLst>
-              <a:ext uri="{FF2B5EF4-FFF2-40B4-BE49-F238E27FC236}">
-                <a16:creationId xmlns:a16="http://schemas.microsoft.com/office/drawing/2014/main" id="{F01CF5D3-D3B1-1944-CFDF-D8EE11DE42AA}"/>
-              </a:ext>
-            </a:extLst>
-          </p:cNvPr>
-          <p:cNvGraphicFramePr>
-            <a:graphicFrameLocks noGrp="1"/>
-          </p:cNvGraphicFramePr>
-          <p:nvPr>
-            <p:ph type="tbl" sz="quarter" idx="13"/>
-            <p:extLst>
-              <p:ext uri="{D42A27DB-BD31-4B8C-83A1-F6EECF244321}">
-                <p14:modId xmlns:p14="http://schemas.microsoft.com/office/powerpoint/2010/main" val="1428147815"/>
-              </p:ext>
-            </p:extLst>
-          </p:nvPr>
-        </p:nvGraphicFramePr>
-        <p:xfrm>
-          <a:off x="4038600" y="1825625"/>
-          <a:ext cx="7315200" cy="4297679"/>
-        </p:xfrm>
-        <a:graphic>
-          <a:graphicData uri="http://schemas.openxmlformats.org/drawingml/2006/table">
-            <a:tbl>
-              <a:tblPr firstRow="1" bandRow="1">
-                <a:tableStyleId>{72833802-FEF1-4C79-8D5D-14CF1EAF98D9}</a:tableStyleId>
-              </a:tblPr>
-              <a:tblGrid>
-                <a:gridCol w="2667000">
-                  <a:extLst>
-                    <a:ext uri="{9D8B030D-6E8A-4147-A177-3AD203B41FA5}">
-                      <a16:colId xmlns:a16="http://schemas.microsoft.com/office/drawing/2014/main" val="127040821"/>
-                    </a:ext>
-                  </a:extLst>
-                </a:gridCol>
-                <a:gridCol w="2217683">
-                  <a:extLst>
-                    <a:ext uri="{9D8B030D-6E8A-4147-A177-3AD203B41FA5}">
-                      <a16:colId xmlns:a16="http://schemas.microsoft.com/office/drawing/2014/main" val="149845700"/>
-                    </a:ext>
-                  </a:extLst>
-                </a:gridCol>
-                <a:gridCol w="1198179">
-                  <a:extLst>
-                    <a:ext uri="{9D8B030D-6E8A-4147-A177-3AD203B41FA5}">
-                      <a16:colId xmlns:a16="http://schemas.microsoft.com/office/drawing/2014/main" val="3119692462"/>
-                    </a:ext>
-                  </a:extLst>
-                </a:gridCol>
-                <a:gridCol w="1232338">
-                  <a:extLst>
-                    <a:ext uri="{9D8B030D-6E8A-4147-A177-3AD203B41FA5}">
-                      <a16:colId xmlns:a16="http://schemas.microsoft.com/office/drawing/2014/main" val="3472639139"/>
-                    </a:ext>
-                  </a:extLst>
-                </a:gridCol>
-              </a:tblGrid>
-              <a:tr h="684715">
-                <a:tc>
-                  <a:txBody>
-                    <a:bodyPr/>
-                    <a:lstStyle/>
-                    <a:p>
-                      <a:pPr algn="ctr"/>
-                      <a:r>
-                        <a:rPr lang="en-US" b="1" i="0" dirty="0">
-                          <a:latin typeface="+mj-lt"/>
-                        </a:rPr>
-                        <a:t>Metric</a:t>
-                      </a:r>
-                    </a:p>
-                  </a:txBody>
-                  <a:tcPr anchor="ctr"/>
-                </a:tc>
-                <a:tc>
-                  <a:txBody>
-                    <a:bodyPr/>
-                    <a:lstStyle/>
-                    <a:p>
-                      <a:pPr algn="ctr"/>
-                      <a:r>
-                        <a:rPr lang="en-US" b="1" i="0" dirty="0">
-                          <a:latin typeface="+mj-lt"/>
-                        </a:rPr>
-                        <a:t>Measurement</a:t>
-                      </a:r>
-                    </a:p>
-                  </a:txBody>
-                  <a:tcPr anchor="ctr"/>
-                </a:tc>
-                <a:tc>
-                  <a:txBody>
-                    <a:bodyPr/>
-                    <a:lstStyle/>
-                    <a:p>
-                      <a:pPr algn="ctr"/>
-                      <a:r>
-                        <a:rPr lang="en-US" b="1" i="0" dirty="0">
-                          <a:latin typeface="+mj-lt"/>
-                        </a:rPr>
-                        <a:t>Target</a:t>
-                      </a:r>
-                    </a:p>
-                  </a:txBody>
-                  <a:tcPr anchor="ctr"/>
-                </a:tc>
-                <a:tc>
-                  <a:txBody>
-                    <a:bodyPr/>
-                    <a:lstStyle/>
-                    <a:p>
-                      <a:pPr algn="ctr"/>
-                      <a:r>
-                        <a:rPr lang="en-US" b="1" i="0" dirty="0">
-                          <a:latin typeface="+mj-lt"/>
-                        </a:rPr>
-                        <a:t>Actual</a:t>
-                      </a:r>
-                    </a:p>
-                  </a:txBody>
-                  <a:tcPr anchor="ctr"/>
-                </a:tc>
-                <a:extLst>
-                  <a:ext uri="{0D108BD9-81ED-4DB2-BD59-A6C34878D82A}">
-                    <a16:rowId xmlns:a16="http://schemas.microsoft.com/office/drawing/2014/main" val="3298013591"/>
-                  </a:ext>
-                </a:extLst>
-              </a:tr>
-              <a:tr h="684715">
-                <a:tc>
-                  <a:txBody>
-                    <a:bodyPr/>
-                    <a:lstStyle/>
-                    <a:p>
-                      <a:pPr algn="ctr"/>
-                      <a:r>
-                        <a:rPr lang="en-US" b="0" i="0" dirty="0">
-                          <a:latin typeface="+mn-lt"/>
-                        </a:rPr>
-                        <a:t>Audience attendance</a:t>
-                      </a:r>
-                    </a:p>
-                  </a:txBody>
-                  <a:tcPr anchor="ctr"/>
-                </a:tc>
-                <a:tc>
-                  <a:txBody>
-                    <a:bodyPr/>
-                    <a:lstStyle/>
-                    <a:p>
-                      <a:pPr algn="ctr"/>
-                      <a:r>
-                        <a:rPr lang="en-US" b="0" i="0" dirty="0">
-                          <a:latin typeface="+mn-lt"/>
-                        </a:rPr>
-                        <a:t># of attendees</a:t>
-                      </a:r>
-                    </a:p>
-                  </a:txBody>
-                  <a:tcPr anchor="ctr"/>
-                </a:tc>
-                <a:tc>
-                  <a:txBody>
-                    <a:bodyPr/>
-                    <a:lstStyle/>
-                    <a:p>
-                      <a:pPr algn="ctr"/>
-                      <a:r>
-                        <a:rPr lang="en-US" b="0" i="0" dirty="0">
-                          <a:latin typeface="+mn-lt"/>
-                        </a:rPr>
-                        <a:t>150</a:t>
-                      </a:r>
-                    </a:p>
-                  </a:txBody>
-                  <a:tcPr anchor="ctr"/>
-                </a:tc>
-                <a:tc>
-                  <a:txBody>
-                    <a:bodyPr/>
-                    <a:lstStyle/>
-                    <a:p>
-                      <a:pPr algn="ctr"/>
-                      <a:r>
-                        <a:rPr lang="en-US" b="0" i="0" dirty="0">
-                          <a:latin typeface="+mn-lt"/>
-                        </a:rPr>
-                        <a:t>120</a:t>
-                      </a:r>
-                    </a:p>
-                  </a:txBody>
-                  <a:tcPr anchor="ctr"/>
-                </a:tc>
-                <a:extLst>
-                  <a:ext uri="{0D108BD9-81ED-4DB2-BD59-A6C34878D82A}">
-                    <a16:rowId xmlns:a16="http://schemas.microsoft.com/office/drawing/2014/main" val="3873867931"/>
-                  </a:ext>
-                </a:extLst>
-              </a:tr>
-              <a:tr h="684715">
-                <a:tc>
-                  <a:txBody>
-                    <a:bodyPr/>
-                    <a:lstStyle/>
-                    <a:p>
-                      <a:pPr algn="ctr"/>
-                      <a:r>
-                        <a:rPr lang="en-US" b="0" i="0" dirty="0">
-                          <a:latin typeface="+mn-lt"/>
-                        </a:rPr>
-                        <a:t>Engagement duration</a:t>
-                      </a:r>
-                    </a:p>
-                  </a:txBody>
-                  <a:tcPr anchor="ctr"/>
-                </a:tc>
-                <a:tc>
-                  <a:txBody>
-                    <a:bodyPr/>
-                    <a:lstStyle/>
-                    <a:p>
-                      <a:pPr algn="ctr"/>
-                      <a:r>
-                        <a:rPr lang="en-US" b="0" i="0" dirty="0">
-                          <a:latin typeface="+mn-lt"/>
-                        </a:rPr>
-                        <a:t>Minutes</a:t>
-                      </a:r>
-                    </a:p>
-                  </a:txBody>
-                  <a:tcPr anchor="ctr"/>
-                </a:tc>
-                <a:tc>
-                  <a:txBody>
-                    <a:bodyPr/>
-                    <a:lstStyle/>
-                    <a:p>
-                      <a:pPr algn="ctr"/>
-                      <a:r>
-                        <a:rPr lang="en-US" b="0" i="0" dirty="0">
-                          <a:latin typeface="+mn-lt"/>
-                        </a:rPr>
-                        <a:t>60</a:t>
-                      </a:r>
-                    </a:p>
-                  </a:txBody>
-                  <a:tcPr anchor="ctr"/>
-                </a:tc>
-                <a:tc>
-                  <a:txBody>
-                    <a:bodyPr/>
-                    <a:lstStyle/>
-                    <a:p>
-                      <a:pPr algn="ctr"/>
-                      <a:r>
-                        <a:rPr lang="en-US" b="0" i="0" dirty="0">
-                          <a:latin typeface="+mn-lt"/>
-                        </a:rPr>
-                        <a:t>75</a:t>
-                      </a:r>
-                    </a:p>
-                  </a:txBody>
-                  <a:tcPr anchor="ctr"/>
-                </a:tc>
-                <a:extLst>
-                  <a:ext uri="{0D108BD9-81ED-4DB2-BD59-A6C34878D82A}">
-                    <a16:rowId xmlns:a16="http://schemas.microsoft.com/office/drawing/2014/main" val="85209771"/>
-                  </a:ext>
-                </a:extLst>
-              </a:tr>
-              <a:tr h="684715">
-                <a:tc>
-                  <a:txBody>
-                    <a:bodyPr/>
-                    <a:lstStyle/>
-                    <a:p>
-                      <a:pPr algn="ctr"/>
-                      <a:r>
-                        <a:rPr lang="en-US" b="0" i="0" dirty="0">
-                          <a:latin typeface="+mn-lt"/>
-                        </a:rPr>
-                        <a:t>Q&amp;A interaction</a:t>
-                      </a:r>
-                    </a:p>
-                  </a:txBody>
-                  <a:tcPr anchor="ctr"/>
-                </a:tc>
-                <a:tc>
-                  <a:txBody>
-                    <a:bodyPr/>
-                    <a:lstStyle/>
-                    <a:p>
-                      <a:pPr algn="ctr"/>
-                      <a:r>
-                        <a:rPr lang="en-US" b="0" i="0" dirty="0">
-                          <a:latin typeface="+mn-lt"/>
-                        </a:rPr>
-                        <a:t># of questions</a:t>
-                      </a:r>
-                    </a:p>
-                  </a:txBody>
-                  <a:tcPr anchor="ctr"/>
-                </a:tc>
-                <a:tc>
-                  <a:txBody>
-                    <a:bodyPr/>
-                    <a:lstStyle/>
-                    <a:p>
-                      <a:pPr algn="ctr"/>
-                      <a:r>
-                        <a:rPr lang="en-US" b="0" i="0" dirty="0">
-                          <a:latin typeface="+mn-lt"/>
-                        </a:rPr>
-                        <a:t>10</a:t>
-                      </a:r>
-                    </a:p>
-                  </a:txBody>
-                  <a:tcPr anchor="ctr"/>
-                </a:tc>
-                <a:tc>
-                  <a:txBody>
-                    <a:bodyPr/>
-                    <a:lstStyle/>
-                    <a:p>
-                      <a:pPr algn="ctr"/>
-                      <a:r>
-                        <a:rPr lang="en-US" b="0" i="0" dirty="0">
-                          <a:latin typeface="+mn-lt"/>
-                        </a:rPr>
-                        <a:t>15</a:t>
-                      </a:r>
-                    </a:p>
-                  </a:txBody>
-                  <a:tcPr anchor="ctr"/>
-                </a:tc>
-                <a:extLst>
-                  <a:ext uri="{0D108BD9-81ED-4DB2-BD59-A6C34878D82A}">
-                    <a16:rowId xmlns:a16="http://schemas.microsoft.com/office/drawing/2014/main" val="4061031278"/>
-                  </a:ext>
-                </a:extLst>
-              </a:tr>
-              <a:tr h="684715">
-                <a:tc>
-                  <a:txBody>
-                    <a:bodyPr/>
-                    <a:lstStyle/>
-                    <a:p>
-                      <a:pPr algn="ctr"/>
-                      <a:r>
-                        <a:rPr lang="en-US" b="0" i="0" dirty="0">
-                          <a:latin typeface="+mn-lt"/>
-                        </a:rPr>
-                        <a:t>Positive feedback</a:t>
-                      </a:r>
-                    </a:p>
-                  </a:txBody>
-                  <a:tcPr anchor="ctr"/>
-                </a:tc>
-                <a:tc>
-                  <a:txBody>
-                    <a:bodyPr/>
-                    <a:lstStyle/>
-                    <a:p>
-                      <a:pPr algn="ctr"/>
-                      <a:r>
-                        <a:rPr lang="en-US" b="0" i="0" dirty="0">
-                          <a:latin typeface="+mn-lt"/>
-                        </a:rPr>
-                        <a:t>Percentage (%)</a:t>
-                      </a:r>
-                    </a:p>
-                  </a:txBody>
-                  <a:tcPr anchor="ctr"/>
-                </a:tc>
-                <a:tc>
-                  <a:txBody>
-                    <a:bodyPr/>
-                    <a:lstStyle/>
-                    <a:p>
-                      <a:pPr algn="ctr"/>
-                      <a:r>
-                        <a:rPr lang="en-US" b="0" i="0" dirty="0">
-                          <a:latin typeface="+mn-lt"/>
-                        </a:rPr>
-                        <a:t>90</a:t>
-                      </a:r>
-                    </a:p>
-                  </a:txBody>
-                  <a:tcPr anchor="ctr"/>
-                </a:tc>
-                <a:tc>
-                  <a:txBody>
-                    <a:bodyPr/>
-                    <a:lstStyle/>
-                    <a:p>
-                      <a:pPr algn="ctr"/>
-                      <a:r>
-                        <a:rPr lang="en-US" b="0" i="0" dirty="0">
-                          <a:latin typeface="+mn-lt"/>
-                        </a:rPr>
-                        <a:t>95</a:t>
-                      </a:r>
-                    </a:p>
-                  </a:txBody>
-                  <a:tcPr anchor="ctr"/>
-                </a:tc>
-                <a:extLst>
-                  <a:ext uri="{0D108BD9-81ED-4DB2-BD59-A6C34878D82A}">
-                    <a16:rowId xmlns:a16="http://schemas.microsoft.com/office/drawing/2014/main" val="3591840781"/>
-                  </a:ext>
-                </a:extLst>
-              </a:tr>
-              <a:tr h="874104">
-                <a:tc>
-                  <a:txBody>
-                    <a:bodyPr/>
-                    <a:lstStyle/>
-                    <a:p>
-                      <a:pPr algn="ctr"/>
-                      <a:r>
-                        <a:rPr lang="en-US" b="0" i="0" dirty="0">
-                          <a:latin typeface="+mn-lt"/>
-                        </a:rPr>
-                        <a:t>Rate of information retention</a:t>
-                      </a:r>
-                    </a:p>
-                  </a:txBody>
-                  <a:tcPr anchor="ctr"/>
-                </a:tc>
-                <a:tc>
-                  <a:txBody>
-                    <a:bodyPr/>
-                    <a:lstStyle/>
-                    <a:p>
-                      <a:pPr algn="ctr"/>
-                      <a:r>
-                        <a:rPr lang="en-US" b="0" i="0" dirty="0">
-                          <a:latin typeface="+mn-lt"/>
-                        </a:rPr>
-                        <a:t>Percentage (%)</a:t>
-                      </a:r>
-                    </a:p>
-                  </a:txBody>
-                  <a:tcPr anchor="ctr"/>
-                </a:tc>
-                <a:tc>
-                  <a:txBody>
-                    <a:bodyPr/>
-                    <a:lstStyle/>
-                    <a:p>
-                      <a:pPr algn="ctr"/>
-                      <a:r>
-                        <a:rPr lang="en-US" b="0" i="0" dirty="0">
-                          <a:latin typeface="+mn-lt"/>
-                        </a:rPr>
-                        <a:t>80</a:t>
-                      </a:r>
-                    </a:p>
-                  </a:txBody>
-                  <a:tcPr anchor="ctr"/>
-                </a:tc>
-                <a:tc>
-                  <a:txBody>
-                    <a:bodyPr/>
-                    <a:lstStyle/>
-                    <a:p>
-                      <a:pPr algn="ctr"/>
-                      <a:r>
-                        <a:rPr lang="en-US" b="0" i="0" dirty="0">
-                          <a:latin typeface="+mn-lt"/>
-                        </a:rPr>
-                        <a:t>85</a:t>
-                      </a:r>
-                    </a:p>
-                  </a:txBody>
-                  <a:tcPr anchor="ctr"/>
-                </a:tc>
-                <a:extLst>
-                  <a:ext uri="{0D108BD9-81ED-4DB2-BD59-A6C34878D82A}">
-                    <a16:rowId xmlns:a16="http://schemas.microsoft.com/office/drawing/2014/main" val="335389741"/>
-                  </a:ext>
-                </a:extLst>
-              </a:tr>
-            </a:tbl>
-          </a:graphicData>
-        </a:graphic>
-      </p:graphicFrame>
     </p:spTree>
     <p:extLst>
       <p:ext uri="{BB962C8B-B14F-4D97-AF65-F5344CB8AC3E}">
-        <p14:creationId xmlns:p14="http://schemas.microsoft.com/office/powerpoint/2010/main" val="4259977132"/>
+        <p14:creationId xmlns:p14="http://schemas.microsoft.com/office/powerpoint/2010/main" val="2737241225"/>
       </p:ext>
     </p:extLst>
   </p:cSld>
@@ -13499,7 +13411,13 @@
   <p:cSld>
     <p:spTree>
       <p:nvGrpSpPr>
-        <p:cNvPr id="1" name=""/>
+        <p:cNvPr id="1" name="">
+          <a:extLst>
+            <a:ext uri="{FF2B5EF4-FFF2-40B4-BE49-F238E27FC236}">
+              <a16:creationId xmlns:a16="http://schemas.microsoft.com/office/drawing/2014/main" id="{8C7CF337-9444-BDE2-391D-E6D96D114DD1}"/>
+            </a:ext>
+          </a:extLst>
+        </p:cNvPr>
         <p:cNvGrpSpPr/>
         <p:nvPr/>
       </p:nvGrpSpPr>
@@ -13516,7 +13434,7 @@
           <p:cNvPr id="2" name="Title 1">
             <a:extLst>
               <a:ext uri="{FF2B5EF4-FFF2-40B4-BE49-F238E27FC236}">
-                <a16:creationId xmlns:a16="http://schemas.microsoft.com/office/drawing/2014/main" id="{5D030A76-B788-B363-104E-266B7C7F7208}"/>
+                <a16:creationId xmlns:a16="http://schemas.microsoft.com/office/drawing/2014/main" id="{A8149EFE-6819-4AAF-AED5-AC0607669012}"/>
               </a:ext>
             </a:extLst>
           </p:cNvPr>
@@ -13539,8 +13457,8 @@
           <a:lstStyle/>
           <a:p>
             <a:r>
-              <a:rPr lang="en-US" dirty="0"/>
-              <a:t>Final tips &amp; takeaways</a:t>
+              <a:rPr lang="en-US" sz="3600" dirty="0"/>
+              <a:t>Some custom hooks used as good practice</a:t>
             </a:r>
           </a:p>
         </p:txBody>
@@ -13550,7 +13468,7 @@
           <p:cNvPr id="3" name="Content Placeholder 2">
             <a:extLst>
               <a:ext uri="{FF2B5EF4-FFF2-40B4-BE49-F238E27FC236}">
-                <a16:creationId xmlns:a16="http://schemas.microsoft.com/office/drawing/2014/main" id="{05948542-FCE1-3AE6-C6C9-17975609DF70}"/>
+                <a16:creationId xmlns:a16="http://schemas.microsoft.com/office/drawing/2014/main" id="{F1BB8534-DD01-AED9-D9BD-E7B1B6BDA2C5}"/>
               </a:ext>
             </a:extLst>
           </p:cNvPr>
@@ -13558,99 +13476,13 @@
             <a:spLocks noGrp="1"/>
           </p:cNvSpPr>
           <p:nvPr>
-            <p:ph sz="half" idx="13"/>
+            <p:ph sz="half" idx="1"/>
           </p:nvPr>
         </p:nvSpPr>
         <p:spPr>
           <a:xfrm>
-            <a:off x="838200" y="1825625"/>
-            <a:ext cx="6934200" cy="4297680"/>
-          </a:xfrm>
-          <a:noFill/>
-        </p:spPr>
-        <p:txBody>
-          <a:bodyPr vert="horz" lIns="91440" tIns="45720" rIns="91440" bIns="45720" rtlCol="0" anchor="t">
-            <a:normAutofit/>
-          </a:bodyPr>
-          <a:lstStyle/>
-          <a:p>
-            <a:r>
-              <a:rPr lang="en-US" dirty="0"/>
-              <a:t>Consistent rehearsal</a:t>
-            </a:r>
-          </a:p>
-          <a:p>
-            <a:pPr lvl="1"/>
-            <a:r>
-              <a:rPr lang="en-US" dirty="0"/>
-              <a:t>Strengthen your familiarity</a:t>
-            </a:r>
-          </a:p>
-          <a:p>
-            <a:r>
-              <a:rPr lang="en-US" dirty="0"/>
-              <a:t>Refine delivery style</a:t>
-            </a:r>
-          </a:p>
-          <a:p>
-            <a:pPr lvl="1"/>
-            <a:r>
-              <a:rPr lang="en-US" dirty="0"/>
-              <a:t>Pacing, tone, and emphasis</a:t>
-            </a:r>
-          </a:p>
-          <a:p>
-            <a:r>
-              <a:rPr lang="en-US" dirty="0"/>
-              <a:t>Timing and transitions</a:t>
-            </a:r>
-          </a:p>
-          <a:p>
-            <a:pPr lvl="1"/>
-            <a:r>
-              <a:rPr lang="en-US" dirty="0"/>
-              <a:t>Aim for seamless, professional delivery</a:t>
-            </a:r>
-          </a:p>
-          <a:p>
-            <a:r>
-              <a:rPr lang="en-US" dirty="0"/>
-              <a:t>Practice audience</a:t>
-            </a:r>
-          </a:p>
-          <a:p>
-            <a:pPr lvl="1"/>
-            <a:r>
-              <a:rPr lang="en-US" dirty="0"/>
-              <a:t>Enlist colleagues to listen &amp; provide feedback</a:t>
-            </a:r>
-          </a:p>
-          <a:p>
-            <a:pPr lvl="1"/>
-            <a:endParaRPr lang="en-US" dirty="0"/>
-          </a:p>
-        </p:txBody>
-      </p:sp>
-      <p:sp>
-        <p:nvSpPr>
-          <p:cNvPr id="4" name="Content Placeholder 3">
-            <a:extLst>
-              <a:ext uri="{FF2B5EF4-FFF2-40B4-BE49-F238E27FC236}">
-                <a16:creationId xmlns:a16="http://schemas.microsoft.com/office/drawing/2014/main" id="{3EE67564-0457-E486-97D0-8109D2C97B3F}"/>
-              </a:ext>
-            </a:extLst>
-          </p:cNvPr>
-          <p:cNvSpPr>
-            <a:spLocks noGrp="1"/>
-          </p:cNvSpPr>
-          <p:nvPr>
-            <p:ph sz="half" idx="2"/>
-          </p:nvPr>
-        </p:nvSpPr>
-        <p:spPr>
-          <a:xfrm>
-            <a:off x="7903029" y="1825625"/>
-            <a:ext cx="3450771" cy="4297680"/>
+            <a:off x="838201" y="1825625"/>
+            <a:ext cx="4459513" cy="4297680"/>
           </a:xfrm>
           <a:noFill/>
         </p:spPr>
@@ -13661,40 +13493,334 @@
           <a:lstStyle/>
           <a:p>
             <a:r>
-              <a:rPr lang="en-US" dirty="0"/>
-              <a:t>Seek feedback</a:t>
-            </a:r>
-          </a:p>
-          <a:p>
-            <a:r>
-              <a:rPr lang="en-US" dirty="0"/>
-              <a:t>Reflect on performance</a:t>
-            </a:r>
-          </a:p>
-          <a:p>
-            <a:r>
-              <a:rPr lang="en-US" dirty="0"/>
-              <a:t>Explore new techniques</a:t>
-            </a:r>
-          </a:p>
-          <a:p>
-            <a:r>
-              <a:rPr lang="en-US" dirty="0"/>
-              <a:t>Set personal goals</a:t>
-            </a:r>
-          </a:p>
-          <a:p>
-            <a:r>
-              <a:rPr lang="en-US" dirty="0"/>
-              <a:t>Iterate and adapt</a:t>
-            </a:r>
+              <a:rPr lang="en-US" sz="2800" dirty="0" err="1"/>
+              <a:t>useFetch</a:t>
+            </a:r>
+            <a:endParaRPr lang="en-US" sz="2800" dirty="0"/>
+          </a:p>
+          <a:p>
+            <a:r>
+              <a:rPr lang="en-US" sz="2800" dirty="0" err="1"/>
+              <a:t>useLocalSorage</a:t>
+            </a:r>
+            <a:r>
+              <a:rPr lang="en-US" sz="2800" dirty="0"/>
+              <a:t>()</a:t>
+            </a:r>
+          </a:p>
+          <a:p>
+            <a:r>
+              <a:rPr lang="en-US" sz="2800" dirty="0" err="1"/>
+              <a:t>useTheme</a:t>
+            </a:r>
+            <a:r>
+              <a:rPr lang="en-US" sz="2800" dirty="0"/>
+              <a:t>()</a:t>
+            </a:r>
+          </a:p>
+          <a:p>
+            <a:r>
+              <a:rPr lang="en-US" sz="2800" dirty="0" err="1"/>
+              <a:t>useAuth</a:t>
+            </a:r>
+            <a:r>
+              <a:rPr lang="en-US" sz="2800" dirty="0"/>
+              <a:t>()</a:t>
+            </a:r>
+          </a:p>
+          <a:p>
+            <a:r>
+              <a:rPr lang="en-US" sz="2800" dirty="0" err="1"/>
+              <a:t>useWindowSize</a:t>
+            </a:r>
+            <a:r>
+              <a:rPr lang="en-US" sz="2800" dirty="0"/>
+              <a:t>()</a:t>
+            </a:r>
+          </a:p>
+          <a:p>
+            <a:r>
+              <a:rPr lang="en-US" sz="2800" dirty="0" err="1"/>
+              <a:t>useMediaQuery</a:t>
+            </a:r>
+            <a:r>
+              <a:rPr lang="en-US" sz="2800" dirty="0"/>
+              <a:t>()</a:t>
+            </a:r>
+          </a:p>
+          <a:p>
+            <a:endParaRPr lang="en-US" sz="3200" dirty="0"/>
+          </a:p>
+          <a:p>
+            <a:endParaRPr lang="en-US" sz="3200" dirty="0"/>
+          </a:p>
+          <a:p>
+            <a:endParaRPr lang="en-US" sz="3200" dirty="0"/>
+          </a:p>
+          <a:p>
+            <a:endParaRPr lang="en-US" sz="3200" dirty="0"/>
+          </a:p>
+          <a:p>
+            <a:endParaRPr lang="en-US" sz="3200" dirty="0"/>
+          </a:p>
+        </p:txBody>
+      </p:sp>
+      <p:sp>
+        <p:nvSpPr>
+          <p:cNvPr id="4" name="Content Placeholder 2">
+            <a:extLst>
+              <a:ext uri="{FF2B5EF4-FFF2-40B4-BE49-F238E27FC236}">
+                <a16:creationId xmlns:a16="http://schemas.microsoft.com/office/drawing/2014/main" id="{51077C2D-AAB0-57BD-1AC4-5EAB6B6642D7}"/>
+              </a:ext>
+            </a:extLst>
+          </p:cNvPr>
+          <p:cNvSpPr txBox="1">
+            <a:spLocks/>
+          </p:cNvSpPr>
+          <p:nvPr/>
+        </p:nvSpPr>
+        <p:spPr>
+          <a:xfrm>
+            <a:off x="5635173" y="1694770"/>
+            <a:ext cx="4459513" cy="4297680"/>
+          </a:xfrm>
+          <a:prstGeom prst="rect">
+            <a:avLst/>
+          </a:prstGeom>
+          <a:noFill/>
+        </p:spPr>
+        <p:txBody>
+          <a:bodyPr vert="horz" lIns="91440" tIns="45720" rIns="91440" bIns="45720" rtlCol="0">
+            <a:normAutofit/>
+          </a:bodyPr>
+          <a:lstStyle>
+            <a:lvl1pPr marL="228600" indent="-228600" algn="l" defTabSz="914400" rtl="0" eaLnBrk="1" latinLnBrk="0" hangingPunct="1">
+              <a:lnSpc>
+                <a:spcPct val="90000"/>
+              </a:lnSpc>
+              <a:spcBef>
+                <a:spcPts val="1000"/>
+              </a:spcBef>
+              <a:spcAft>
+                <a:spcPts val="800"/>
+              </a:spcAft>
+              <a:buClr>
+                <a:schemeClr val="accent2"/>
+              </a:buClr>
+              <a:buFont typeface="Arial" panose="020B0604020202020204" pitchFamily="34" charset="0"/>
+              <a:buChar char="•"/>
+              <a:defRPr sz="1800" kern="1200">
+                <a:solidFill>
+                  <a:schemeClr val="tx1"/>
+                </a:solidFill>
+                <a:latin typeface="+mn-lt"/>
+                <a:ea typeface="+mn-ea"/>
+                <a:cs typeface="+mn-cs"/>
+              </a:defRPr>
+            </a:lvl1pPr>
+            <a:lvl2pPr marL="285750" indent="-285750" algn="l" defTabSz="914400" rtl="0" eaLnBrk="1" latinLnBrk="0" hangingPunct="1">
+              <a:lnSpc>
+                <a:spcPct val="90000"/>
+              </a:lnSpc>
+              <a:spcBef>
+                <a:spcPts val="1000"/>
+              </a:spcBef>
+              <a:spcAft>
+                <a:spcPts val="800"/>
+              </a:spcAft>
+              <a:buClr>
+                <a:schemeClr val="accent2"/>
+              </a:buClr>
+              <a:buFont typeface="Arial" panose="020B0604020202020204" pitchFamily="34" charset="0"/>
+              <a:buChar char="•"/>
+              <a:defRPr sz="1800" kern="1200">
+                <a:solidFill>
+                  <a:schemeClr val="tx1"/>
+                </a:solidFill>
+                <a:latin typeface="+mn-lt"/>
+                <a:ea typeface="+mn-ea"/>
+                <a:cs typeface="+mn-cs"/>
+              </a:defRPr>
+            </a:lvl2pPr>
+            <a:lvl3pPr marL="651510" indent="-285750" algn="l" defTabSz="914400" rtl="0" eaLnBrk="1" latinLnBrk="0" hangingPunct="1">
+              <a:lnSpc>
+                <a:spcPct val="90000"/>
+              </a:lnSpc>
+              <a:spcBef>
+                <a:spcPts val="1000"/>
+              </a:spcBef>
+              <a:spcAft>
+                <a:spcPts val="800"/>
+              </a:spcAft>
+              <a:buClr>
+                <a:schemeClr val="accent2"/>
+              </a:buClr>
+              <a:buFont typeface="Arial" panose="020B0604020202020204" pitchFamily="34" charset="0"/>
+              <a:buChar char="•"/>
+              <a:defRPr sz="1800" kern="1200">
+                <a:solidFill>
+                  <a:schemeClr val="tx1"/>
+                </a:solidFill>
+                <a:latin typeface="+mn-lt"/>
+                <a:ea typeface="+mn-ea"/>
+                <a:cs typeface="+mn-cs"/>
+              </a:defRPr>
+            </a:lvl3pPr>
+            <a:lvl4pPr marL="925830" indent="-285750" algn="l" defTabSz="914400" rtl="0" eaLnBrk="1" latinLnBrk="0" hangingPunct="1">
+              <a:lnSpc>
+                <a:spcPct val="90000"/>
+              </a:lnSpc>
+              <a:spcBef>
+                <a:spcPts val="1000"/>
+              </a:spcBef>
+              <a:spcAft>
+                <a:spcPts val="800"/>
+              </a:spcAft>
+              <a:buClr>
+                <a:schemeClr val="accent2"/>
+              </a:buClr>
+              <a:buFont typeface="Arial" panose="020B0604020202020204" pitchFamily="34" charset="0"/>
+              <a:buChar char="•"/>
+              <a:defRPr sz="1800" kern="1200">
+                <a:solidFill>
+                  <a:schemeClr val="tx1"/>
+                </a:solidFill>
+                <a:latin typeface="+mn-lt"/>
+                <a:ea typeface="+mn-ea"/>
+                <a:cs typeface="+mn-cs"/>
+              </a:defRPr>
+            </a:lvl4pPr>
+            <a:lvl5pPr marL="1200150" indent="-285750" algn="l" defTabSz="914400" rtl="0" eaLnBrk="1" latinLnBrk="0" hangingPunct="1">
+              <a:lnSpc>
+                <a:spcPct val="90000"/>
+              </a:lnSpc>
+              <a:spcBef>
+                <a:spcPts val="1000"/>
+              </a:spcBef>
+              <a:spcAft>
+                <a:spcPts val="800"/>
+              </a:spcAft>
+              <a:buClr>
+                <a:schemeClr val="accent2"/>
+              </a:buClr>
+              <a:buFont typeface="Arial" panose="020B0604020202020204" pitchFamily="34" charset="0"/>
+              <a:buChar char="•"/>
+              <a:defRPr sz="1800" kern="1200">
+                <a:solidFill>
+                  <a:schemeClr val="tx1"/>
+                </a:solidFill>
+                <a:latin typeface="+mn-lt"/>
+                <a:ea typeface="+mn-ea"/>
+                <a:cs typeface="+mn-cs"/>
+              </a:defRPr>
+            </a:lvl5pPr>
+            <a:lvl6pPr marL="2514600" indent="-228600" algn="l" defTabSz="914400" rtl="0" eaLnBrk="1" latinLnBrk="0" hangingPunct="1">
+              <a:lnSpc>
+                <a:spcPct val="90000"/>
+              </a:lnSpc>
+              <a:spcBef>
+                <a:spcPts val="500"/>
+              </a:spcBef>
+              <a:buFont typeface="Arial" panose="020B0604020202020204" pitchFamily="34" charset="0"/>
+              <a:buChar char="•"/>
+              <a:defRPr sz="1800" kern="1200">
+                <a:solidFill>
+                  <a:schemeClr val="tx1"/>
+                </a:solidFill>
+                <a:latin typeface="+mn-lt"/>
+                <a:ea typeface="+mn-ea"/>
+                <a:cs typeface="+mn-cs"/>
+              </a:defRPr>
+            </a:lvl6pPr>
+            <a:lvl7pPr marL="2971800" indent="-228600" algn="l" defTabSz="914400" rtl="0" eaLnBrk="1" latinLnBrk="0" hangingPunct="1">
+              <a:lnSpc>
+                <a:spcPct val="90000"/>
+              </a:lnSpc>
+              <a:spcBef>
+                <a:spcPts val="500"/>
+              </a:spcBef>
+              <a:buFont typeface="Arial" panose="020B0604020202020204" pitchFamily="34" charset="0"/>
+              <a:buChar char="•"/>
+              <a:defRPr sz="1800" kern="1200">
+                <a:solidFill>
+                  <a:schemeClr val="tx1"/>
+                </a:solidFill>
+                <a:latin typeface="+mn-lt"/>
+                <a:ea typeface="+mn-ea"/>
+                <a:cs typeface="+mn-cs"/>
+              </a:defRPr>
+            </a:lvl7pPr>
+            <a:lvl8pPr marL="3429000" indent="-228600" algn="l" defTabSz="914400" rtl="0" eaLnBrk="1" latinLnBrk="0" hangingPunct="1">
+              <a:lnSpc>
+                <a:spcPct val="90000"/>
+              </a:lnSpc>
+              <a:spcBef>
+                <a:spcPts val="500"/>
+              </a:spcBef>
+              <a:buFont typeface="Arial" panose="020B0604020202020204" pitchFamily="34" charset="0"/>
+              <a:buChar char="•"/>
+              <a:defRPr sz="1800" kern="1200">
+                <a:solidFill>
+                  <a:schemeClr val="tx1"/>
+                </a:solidFill>
+                <a:latin typeface="+mn-lt"/>
+                <a:ea typeface="+mn-ea"/>
+                <a:cs typeface="+mn-cs"/>
+              </a:defRPr>
+            </a:lvl8pPr>
+            <a:lvl9pPr marL="3886200" indent="-228600" algn="l" defTabSz="914400" rtl="0" eaLnBrk="1" latinLnBrk="0" hangingPunct="1">
+              <a:lnSpc>
+                <a:spcPct val="90000"/>
+              </a:lnSpc>
+              <a:spcBef>
+                <a:spcPts val="500"/>
+              </a:spcBef>
+              <a:buFont typeface="Arial" panose="020B0604020202020204" pitchFamily="34" charset="0"/>
+              <a:buChar char="•"/>
+              <a:defRPr sz="1800" kern="1200">
+                <a:solidFill>
+                  <a:schemeClr val="tx1"/>
+                </a:solidFill>
+                <a:latin typeface="+mn-lt"/>
+                <a:ea typeface="+mn-ea"/>
+                <a:cs typeface="+mn-cs"/>
+              </a:defRPr>
+            </a:lvl9pPr>
+          </a:lstStyle>
+          <a:p>
+            <a:r>
+              <a:rPr lang="en-US" sz="3200" dirty="0" err="1"/>
+              <a:t>useScrollPosition</a:t>
+            </a:r>
+            <a:r>
+              <a:rPr lang="en-US" sz="3200" dirty="0"/>
+              <a:t>()</a:t>
+            </a:r>
+          </a:p>
+          <a:p>
+            <a:endParaRPr lang="en-US" sz="3200" dirty="0"/>
+          </a:p>
+          <a:p>
+            <a:endParaRPr lang="en-US" sz="3200" dirty="0"/>
+          </a:p>
+          <a:p>
+            <a:endParaRPr lang="en-US" sz="3200" dirty="0"/>
+          </a:p>
+          <a:p>
+            <a:endParaRPr lang="en-US" sz="3200" dirty="0"/>
+          </a:p>
+          <a:p>
+            <a:endParaRPr lang="en-US" sz="3200" dirty="0"/>
+          </a:p>
+          <a:p>
+            <a:endParaRPr lang="en-US" sz="3200" dirty="0"/>
           </a:p>
         </p:txBody>
       </p:sp>
     </p:spTree>
     <p:extLst>
       <p:ext uri="{BB962C8B-B14F-4D97-AF65-F5344CB8AC3E}">
-        <p14:creationId xmlns:p14="http://schemas.microsoft.com/office/powerpoint/2010/main" val="414613742"/>
+        <p14:creationId xmlns:p14="http://schemas.microsoft.com/office/powerpoint/2010/main" val="1067412963"/>
       </p:ext>
     </p:extLst>
   </p:cSld>
@@ -13709,7 +13835,13 @@
   <p:cSld>
     <p:spTree>
       <p:nvGrpSpPr>
-        <p:cNvPr id="1" name=""/>
+        <p:cNvPr id="1" name="">
+          <a:extLst>
+            <a:ext uri="{FF2B5EF4-FFF2-40B4-BE49-F238E27FC236}">
+              <a16:creationId xmlns:a16="http://schemas.microsoft.com/office/drawing/2014/main" id="{68FF31D9-7F4D-DE61-B240-32DBFFA7E79E}"/>
+            </a:ext>
+          </a:extLst>
+        </p:cNvPr>
         <p:cNvGrpSpPr/>
         <p:nvPr/>
       </p:nvGrpSpPr>
@@ -13726,7 +13858,7 @@
           <p:cNvPr id="2" name="Title 1">
             <a:extLst>
               <a:ext uri="{FF2B5EF4-FFF2-40B4-BE49-F238E27FC236}">
-                <a16:creationId xmlns:a16="http://schemas.microsoft.com/office/drawing/2014/main" id="{D1FC59F6-9B22-C211-4B4C-A2FD4B914C46}"/>
+                <a16:creationId xmlns:a16="http://schemas.microsoft.com/office/drawing/2014/main" id="{BEF39C41-9376-39C8-3CFD-55C069CB08F8}"/>
               </a:ext>
             </a:extLst>
           </p:cNvPr>
@@ -13734,522 +13866,31 @@
             <a:spLocks noGrp="1"/>
           </p:cNvSpPr>
           <p:nvPr>
-            <p:ph type="title"/>
+            <p:ph type="ctrTitle"/>
           </p:nvPr>
         </p:nvSpPr>
         <p:spPr>
           <a:xfrm>
-            <a:off x="838200" y="365125"/>
-            <a:ext cx="10515600" cy="1325563"/>
+            <a:off x="2815929" y="1897425"/>
+            <a:ext cx="6560142" cy="3063149"/>
           </a:xfrm>
           <a:noFill/>
         </p:spPr>
         <p:txBody>
-          <a:bodyPr anchor="ctr"/>
+          <a:bodyPr/>
           <a:lstStyle/>
           <a:p>
             <a:r>
-              <a:rPr lang="en-US" dirty="0"/>
-              <a:t>Speaking engagement metrics</a:t>
+              <a:rPr lang="en-US" sz="8000" dirty="0"/>
+              <a:t>Third-Party Hooks</a:t>
             </a:r>
           </a:p>
         </p:txBody>
       </p:sp>
-      <p:graphicFrame>
-        <p:nvGraphicFramePr>
-          <p:cNvPr id="4" name="Table Placeholder 3">
-            <a:extLst>
-              <a:ext uri="{FF2B5EF4-FFF2-40B4-BE49-F238E27FC236}">
-                <a16:creationId xmlns:a16="http://schemas.microsoft.com/office/drawing/2014/main" id="{0519CAC4-33D8-0B1E-88FF-086E69894AFB}"/>
-              </a:ext>
-            </a:extLst>
-          </p:cNvPr>
-          <p:cNvGraphicFramePr>
-            <a:graphicFrameLocks noGrp="1"/>
-          </p:cNvGraphicFramePr>
-          <p:nvPr>
-            <p:ph type="tbl" sz="quarter" idx="13"/>
-            <p:extLst>
-              <p:ext uri="{D42A27DB-BD31-4B8C-83A1-F6EECF244321}">
-                <p14:modId xmlns:p14="http://schemas.microsoft.com/office/powerpoint/2010/main" val="422617345"/>
-              </p:ext>
-            </p:extLst>
-          </p:nvPr>
-        </p:nvGraphicFramePr>
-        <p:xfrm>
-          <a:off x="838200" y="1825625"/>
-          <a:ext cx="10515600" cy="4389120"/>
-        </p:xfrm>
-        <a:graphic>
-          <a:graphicData uri="http://schemas.openxmlformats.org/drawingml/2006/table">
-            <a:tbl>
-              <a:tblPr firstRow="1" bandRow="1">
-                <a:tableStyleId>{72833802-FEF1-4C79-8D5D-14CF1EAF98D9}</a:tableStyleId>
-              </a:tblPr>
-              <a:tblGrid>
-                <a:gridCol w="3502572">
-                  <a:extLst>
-                    <a:ext uri="{9D8B030D-6E8A-4147-A177-3AD203B41FA5}">
-                      <a16:colId xmlns:a16="http://schemas.microsoft.com/office/drawing/2014/main" val="2382218087"/>
-                    </a:ext>
-                  </a:extLst>
-                </a:gridCol>
-                <a:gridCol w="2911366">
-                  <a:extLst>
-                    <a:ext uri="{9D8B030D-6E8A-4147-A177-3AD203B41FA5}">
-                      <a16:colId xmlns:a16="http://schemas.microsoft.com/office/drawing/2014/main" val="3953468724"/>
-                    </a:ext>
-                  </a:extLst>
-                </a:gridCol>
-                <a:gridCol w="2123090">
-                  <a:extLst>
-                    <a:ext uri="{9D8B030D-6E8A-4147-A177-3AD203B41FA5}">
-                      <a16:colId xmlns:a16="http://schemas.microsoft.com/office/drawing/2014/main" val="4277526474"/>
-                    </a:ext>
-                  </a:extLst>
-                </a:gridCol>
-                <a:gridCol w="1978572">
-                  <a:extLst>
-                    <a:ext uri="{9D8B030D-6E8A-4147-A177-3AD203B41FA5}">
-                      <a16:colId xmlns:a16="http://schemas.microsoft.com/office/drawing/2014/main" val="2438884888"/>
-                    </a:ext>
-                  </a:extLst>
-                </a:gridCol>
-              </a:tblGrid>
-              <a:tr h="731520">
-                <a:tc>
-                  <a:txBody>
-                    <a:bodyPr/>
-                    <a:lstStyle/>
-                    <a:p>
-                      <a:pPr algn="ctr"/>
-                      <a:r>
-                        <a:rPr lang="en-US" b="1" i="0" dirty="0">
-                          <a:latin typeface="+mj-lt"/>
-                        </a:rPr>
-                        <a:t>Impact  factor</a:t>
-                      </a:r>
-                    </a:p>
-                  </a:txBody>
-                  <a:tcPr anchor="ctr"/>
-                </a:tc>
-                <a:tc>
-                  <a:txBody>
-                    <a:bodyPr/>
-                    <a:lstStyle/>
-                    <a:p>
-                      <a:pPr algn="ctr"/>
-                      <a:r>
-                        <a:rPr lang="en-US" b="1" i="0" dirty="0">
-                          <a:latin typeface="+mj-lt"/>
-                        </a:rPr>
-                        <a:t>Measurement</a:t>
-                      </a:r>
-                    </a:p>
-                  </a:txBody>
-                  <a:tcPr anchor="ctr"/>
-                </a:tc>
-                <a:tc>
-                  <a:txBody>
-                    <a:bodyPr/>
-                    <a:lstStyle/>
-                    <a:p>
-                      <a:pPr algn="ctr"/>
-                      <a:r>
-                        <a:rPr lang="en-US" b="1" i="0" dirty="0">
-                          <a:latin typeface="+mj-lt"/>
-                        </a:rPr>
-                        <a:t>Target</a:t>
-                      </a:r>
-                    </a:p>
-                  </a:txBody>
-                  <a:tcPr anchor="ctr"/>
-                </a:tc>
-                <a:tc>
-                  <a:txBody>
-                    <a:bodyPr/>
-                    <a:lstStyle/>
-                    <a:p>
-                      <a:pPr algn="ctr"/>
-                      <a:r>
-                        <a:rPr lang="en-US" b="1" i="0" dirty="0">
-                          <a:latin typeface="+mj-lt"/>
-                        </a:rPr>
-                        <a:t>Achieved</a:t>
-                      </a:r>
-                    </a:p>
-                  </a:txBody>
-                  <a:tcPr anchor="ctr"/>
-                </a:tc>
-                <a:extLst>
-                  <a:ext uri="{0D108BD9-81ED-4DB2-BD59-A6C34878D82A}">
-                    <a16:rowId xmlns:a16="http://schemas.microsoft.com/office/drawing/2014/main" val="2857107962"/>
-                  </a:ext>
-                </a:extLst>
-              </a:tr>
-              <a:tr h="731520">
-                <a:tc>
-                  <a:txBody>
-                    <a:bodyPr/>
-                    <a:lstStyle/>
-                    <a:p>
-                      <a:pPr algn="ctr"/>
-                      <a:r>
-                        <a:rPr lang="en-US" b="0" i="0" dirty="0">
-                          <a:latin typeface="+mn-lt"/>
-                        </a:rPr>
-                        <a:t>Audience interaction</a:t>
-                      </a:r>
-                    </a:p>
-                  </a:txBody>
-                  <a:tcPr anchor="ctr"/>
-                </a:tc>
-                <a:tc>
-                  <a:txBody>
-                    <a:bodyPr/>
-                    <a:lstStyle/>
-                    <a:p>
-                      <a:pPr algn="ctr"/>
-                      <a:r>
-                        <a:rPr lang="en-US" b="0" i="0" dirty="0">
-                          <a:latin typeface="+mn-lt"/>
-                        </a:rPr>
-                        <a:t>Percentage (%)</a:t>
-                      </a:r>
-                    </a:p>
-                  </a:txBody>
-                  <a:tcPr anchor="ctr"/>
-                </a:tc>
-                <a:tc>
-                  <a:txBody>
-                    <a:bodyPr/>
-                    <a:lstStyle/>
-                    <a:p>
-                      <a:pPr algn="ctr"/>
-                      <a:r>
-                        <a:rPr lang="en-US" b="0" i="0" dirty="0">
-                          <a:latin typeface="+mn-lt"/>
-                        </a:rPr>
-                        <a:t>85</a:t>
-                      </a:r>
-                    </a:p>
-                  </a:txBody>
-                  <a:tcPr anchor="ctr"/>
-                </a:tc>
-                <a:tc>
-                  <a:txBody>
-                    <a:bodyPr/>
-                    <a:lstStyle/>
-                    <a:p>
-                      <a:pPr algn="ctr"/>
-                      <a:r>
-                        <a:rPr lang="en-US" b="0" i="0" dirty="0">
-                          <a:latin typeface="+mn-lt"/>
-                        </a:rPr>
-                        <a:t>88</a:t>
-                      </a:r>
-                    </a:p>
-                  </a:txBody>
-                  <a:tcPr anchor="ctr"/>
-                </a:tc>
-                <a:extLst>
-                  <a:ext uri="{0D108BD9-81ED-4DB2-BD59-A6C34878D82A}">
-                    <a16:rowId xmlns:a16="http://schemas.microsoft.com/office/drawing/2014/main" val="1671386868"/>
-                  </a:ext>
-                </a:extLst>
-              </a:tr>
-              <a:tr h="731520">
-                <a:tc>
-                  <a:txBody>
-                    <a:bodyPr/>
-                    <a:lstStyle/>
-                    <a:p>
-                      <a:pPr algn="ctr"/>
-                      <a:r>
-                        <a:rPr lang="en-US" b="0" i="0" dirty="0">
-                          <a:latin typeface="+mn-lt"/>
-                        </a:rPr>
-                        <a:t>Knowledge retention</a:t>
-                      </a:r>
-                    </a:p>
-                  </a:txBody>
-                  <a:tcPr anchor="ctr"/>
-                </a:tc>
-                <a:tc>
-                  <a:txBody>
-                    <a:bodyPr/>
-                    <a:lstStyle/>
-                    <a:p>
-                      <a:pPr algn="ctr"/>
-                      <a:r>
-                        <a:rPr lang="en-US" b="0" i="0" dirty="0">
-                          <a:latin typeface="+mn-lt"/>
-                        </a:rPr>
-                        <a:t>Percentage (%)</a:t>
-                      </a:r>
-                    </a:p>
-                  </a:txBody>
-                  <a:tcPr anchor="ctr"/>
-                </a:tc>
-                <a:tc>
-                  <a:txBody>
-                    <a:bodyPr/>
-                    <a:lstStyle/>
-                    <a:p>
-                      <a:pPr algn="ctr"/>
-                      <a:r>
-                        <a:rPr lang="en-US" b="0" i="0" dirty="0">
-                          <a:latin typeface="+mn-lt"/>
-                        </a:rPr>
-                        <a:t>75</a:t>
-                      </a:r>
-                    </a:p>
-                  </a:txBody>
-                  <a:tcPr anchor="ctr"/>
-                </a:tc>
-                <a:tc>
-                  <a:txBody>
-                    <a:bodyPr/>
-                    <a:lstStyle/>
-                    <a:p>
-                      <a:pPr algn="ctr"/>
-                      <a:r>
-                        <a:rPr lang="en-US" b="0" i="0" dirty="0">
-                          <a:latin typeface="+mn-lt"/>
-                        </a:rPr>
-                        <a:t>80</a:t>
-                      </a:r>
-                    </a:p>
-                  </a:txBody>
-                  <a:tcPr anchor="ctr"/>
-                </a:tc>
-                <a:extLst>
-                  <a:ext uri="{0D108BD9-81ED-4DB2-BD59-A6C34878D82A}">
-                    <a16:rowId xmlns:a16="http://schemas.microsoft.com/office/drawing/2014/main" val="380626418"/>
-                  </a:ext>
-                </a:extLst>
-              </a:tr>
-              <a:tr h="731520">
-                <a:tc>
-                  <a:txBody>
-                    <a:bodyPr/>
-                    <a:lstStyle/>
-                    <a:p>
-                      <a:pPr algn="ctr"/>
-                      <a:r>
-                        <a:rPr lang="en-US" b="0" i="0" dirty="0">
-                          <a:latin typeface="+mn-lt"/>
-                        </a:rPr>
-                        <a:t>Post-presentation surveys</a:t>
-                      </a:r>
-                    </a:p>
-                  </a:txBody>
-                  <a:tcPr anchor="ctr"/>
-                </a:tc>
-                <a:tc>
-                  <a:txBody>
-                    <a:bodyPr/>
-                    <a:lstStyle/>
-                    <a:p>
-                      <a:pPr algn="ctr"/>
-                      <a:r>
-                        <a:rPr lang="en-US" b="0" i="0" dirty="0">
-                          <a:latin typeface="+mn-lt"/>
-                        </a:rPr>
-                        <a:t>Average rating</a:t>
-                      </a:r>
-                    </a:p>
-                  </a:txBody>
-                  <a:tcPr anchor="ctr"/>
-                </a:tc>
-                <a:tc>
-                  <a:txBody>
-                    <a:bodyPr/>
-                    <a:lstStyle/>
-                    <a:p>
-                      <a:pPr algn="ctr"/>
-                      <a:r>
-                        <a:rPr lang="en-US" b="0" i="0" dirty="0">
-                          <a:latin typeface="+mn-lt"/>
-                        </a:rPr>
-                        <a:t>4.2</a:t>
-                      </a:r>
-                    </a:p>
-                  </a:txBody>
-                  <a:tcPr anchor="ctr"/>
-                </a:tc>
-                <a:tc>
-                  <a:txBody>
-                    <a:bodyPr/>
-                    <a:lstStyle/>
-                    <a:p>
-                      <a:pPr algn="ctr"/>
-                      <a:r>
-                        <a:rPr lang="en-US" b="0" i="0" dirty="0">
-                          <a:latin typeface="+mn-lt"/>
-                        </a:rPr>
-                        <a:t>4.5</a:t>
-                      </a:r>
-                    </a:p>
-                  </a:txBody>
-                  <a:tcPr anchor="ctr"/>
-                </a:tc>
-                <a:extLst>
-                  <a:ext uri="{0D108BD9-81ED-4DB2-BD59-A6C34878D82A}">
-                    <a16:rowId xmlns:a16="http://schemas.microsoft.com/office/drawing/2014/main" val="2132482967"/>
-                  </a:ext>
-                </a:extLst>
-              </a:tr>
-              <a:tr h="731520">
-                <a:tc>
-                  <a:txBody>
-                    <a:bodyPr/>
-                    <a:lstStyle/>
-                    <a:p>
-                      <a:pPr algn="ctr"/>
-                      <a:r>
-                        <a:rPr lang="en-US" b="0" i="0" dirty="0">
-                          <a:latin typeface="+mn-lt"/>
-                        </a:rPr>
-                        <a:t>Referral rate</a:t>
-                      </a:r>
-                    </a:p>
-                  </a:txBody>
-                  <a:tcPr anchor="ctr"/>
-                </a:tc>
-                <a:tc>
-                  <a:txBody>
-                    <a:bodyPr/>
-                    <a:lstStyle/>
-                    <a:p>
-                      <a:pPr algn="ctr"/>
-                      <a:r>
-                        <a:rPr lang="en-US" b="0" i="0" dirty="0">
-                          <a:latin typeface="+mn-lt"/>
-                        </a:rPr>
-                        <a:t>Percentage (%)</a:t>
-                      </a:r>
-                    </a:p>
-                  </a:txBody>
-                  <a:tcPr anchor="ctr"/>
-                </a:tc>
-                <a:tc>
-                  <a:txBody>
-                    <a:bodyPr/>
-                    <a:lstStyle/>
-                    <a:p>
-                      <a:pPr algn="ctr"/>
-                      <a:r>
-                        <a:rPr lang="en-US" b="0" i="0" dirty="0">
-                          <a:latin typeface="+mn-lt"/>
-                        </a:rPr>
-                        <a:t>10</a:t>
-                      </a:r>
-                    </a:p>
-                  </a:txBody>
-                  <a:tcPr anchor="ctr"/>
-                </a:tc>
-                <a:tc>
-                  <a:txBody>
-                    <a:bodyPr/>
-                    <a:lstStyle/>
-                    <a:p>
-                      <a:pPr algn="ctr"/>
-                      <a:r>
-                        <a:rPr lang="en-US" b="0" i="0" dirty="0">
-                          <a:latin typeface="+mn-lt"/>
-                        </a:rPr>
-                        <a:t>12</a:t>
-                      </a:r>
-                    </a:p>
-                  </a:txBody>
-                  <a:tcPr anchor="ctr"/>
-                </a:tc>
-                <a:extLst>
-                  <a:ext uri="{0D108BD9-81ED-4DB2-BD59-A6C34878D82A}">
-                    <a16:rowId xmlns:a16="http://schemas.microsoft.com/office/drawing/2014/main" val="3936251906"/>
-                  </a:ext>
-                </a:extLst>
-              </a:tr>
-              <a:tr h="731520">
-                <a:tc>
-                  <a:txBody>
-                    <a:bodyPr/>
-                    <a:lstStyle/>
-                    <a:p>
-                      <a:pPr algn="ctr"/>
-                      <a:r>
-                        <a:rPr lang="en-US" b="0" i="0" dirty="0">
-                          <a:latin typeface="+mn-lt"/>
-                        </a:rPr>
-                        <a:t>Collaboration opportunities</a:t>
-                      </a:r>
-                    </a:p>
-                  </a:txBody>
-                  <a:tcPr anchor="ctr"/>
-                </a:tc>
-                <a:tc>
-                  <a:txBody>
-                    <a:bodyPr/>
-                    <a:lstStyle/>
-                    <a:p>
-                      <a:pPr algn="ctr"/>
-                      <a:r>
-                        <a:rPr lang="en-US" b="0" i="0" dirty="0">
-                          <a:latin typeface="+mn-lt"/>
-                        </a:rPr>
-                        <a:t># of opportunities</a:t>
-                      </a:r>
-                    </a:p>
-                  </a:txBody>
-                  <a:tcPr anchor="ctr"/>
-                </a:tc>
-                <a:tc>
-                  <a:txBody>
-                    <a:bodyPr/>
-                    <a:lstStyle/>
-                    <a:p>
-                      <a:pPr algn="ctr"/>
-                      <a:r>
-                        <a:rPr lang="en-US" b="0" i="0" dirty="0">
-                          <a:latin typeface="+mn-lt"/>
-                        </a:rPr>
-                        <a:t>8</a:t>
-                      </a:r>
-                    </a:p>
-                  </a:txBody>
-                  <a:tcPr anchor="ctr"/>
-                </a:tc>
-                <a:tc>
-                  <a:txBody>
-                    <a:bodyPr/>
-                    <a:lstStyle/>
-                    <a:p>
-                      <a:pPr algn="ctr"/>
-                      <a:r>
-                        <a:rPr lang="en-US" b="0" i="0" dirty="0">
-                          <a:latin typeface="+mn-lt"/>
-                        </a:rPr>
-                        <a:t>10</a:t>
-                      </a:r>
-                    </a:p>
-                  </a:txBody>
-                  <a:tcPr anchor="ctr"/>
-                </a:tc>
-                <a:extLst>
-                  <a:ext uri="{0D108BD9-81ED-4DB2-BD59-A6C34878D82A}">
-                    <a16:rowId xmlns:a16="http://schemas.microsoft.com/office/drawing/2014/main" val="568537164"/>
-                  </a:ext>
-                </a:extLst>
-              </a:tr>
-            </a:tbl>
-          </a:graphicData>
-        </a:graphic>
-      </p:graphicFrame>
     </p:spTree>
     <p:extLst>
       <p:ext uri="{BB962C8B-B14F-4D97-AF65-F5344CB8AC3E}">
-        <p14:creationId xmlns:p14="http://schemas.microsoft.com/office/powerpoint/2010/main" val="3604630649"/>
+        <p14:creationId xmlns:p14="http://schemas.microsoft.com/office/powerpoint/2010/main" val="1344060079"/>
       </p:ext>
     </p:extLst>
   </p:cSld>
@@ -14264,7 +13905,13 @@
   <p:cSld>
     <p:spTree>
       <p:nvGrpSpPr>
-        <p:cNvPr id="1" name=""/>
+        <p:cNvPr id="1" name="">
+          <a:extLst>
+            <a:ext uri="{FF2B5EF4-FFF2-40B4-BE49-F238E27FC236}">
+              <a16:creationId xmlns:a16="http://schemas.microsoft.com/office/drawing/2014/main" id="{633A5E9E-AE00-BFB0-455A-639549115F50}"/>
+            </a:ext>
+          </a:extLst>
+        </p:cNvPr>
         <p:cNvGrpSpPr/>
         <p:nvPr/>
       </p:nvGrpSpPr>
@@ -14281,7 +13928,7 @@
           <p:cNvPr id="2" name="Title 1">
             <a:extLst>
               <a:ext uri="{FF2B5EF4-FFF2-40B4-BE49-F238E27FC236}">
-                <a16:creationId xmlns:a16="http://schemas.microsoft.com/office/drawing/2014/main" id="{28BAC361-0D7A-DC05-86B5-6DD77D322F5B}"/>
+                <a16:creationId xmlns:a16="http://schemas.microsoft.com/office/drawing/2014/main" id="{18C732E4-3486-F13F-5828-CE01A1516479}"/>
               </a:ext>
             </a:extLst>
           </p:cNvPr>
@@ -14294,18 +13941,18 @@
         </p:nvSpPr>
         <p:spPr>
           <a:xfrm>
-            <a:off x="383876" y="764502"/>
-            <a:ext cx="5315035" cy="5328996"/>
+            <a:off x="838200" y="198437"/>
+            <a:ext cx="5257800" cy="2324046"/>
           </a:xfrm>
           <a:noFill/>
         </p:spPr>
         <p:txBody>
-          <a:bodyPr/>
+          <a:bodyPr anchor="b"/>
           <a:lstStyle/>
           <a:p>
             <a:r>
               <a:rPr lang="en-US" dirty="0"/>
-              <a:t>Thank you</a:t>
+              <a:t>Third-party Hooks</a:t>
             </a:r>
           </a:p>
         </p:txBody>
@@ -14315,7 +13962,7 @@
           <p:cNvPr id="3" name="Content Placeholder 2">
             <a:extLst>
               <a:ext uri="{FF2B5EF4-FFF2-40B4-BE49-F238E27FC236}">
-                <a16:creationId xmlns:a16="http://schemas.microsoft.com/office/drawing/2014/main" id="{1BE98EFF-197D-3136-70B9-7BBD30A48931}"/>
+                <a16:creationId xmlns:a16="http://schemas.microsoft.com/office/drawing/2014/main" id="{12E5B144-CF61-9B03-87AE-D7B8F9DFC3EE}"/>
               </a:ext>
             </a:extLst>
           </p:cNvPr>
@@ -14323,13 +13970,122 @@
             <a:spLocks noGrp="1"/>
           </p:cNvSpPr>
           <p:nvPr>
-            <p:ph idx="1"/>
+            <p:ph sz="half" idx="1"/>
           </p:nvPr>
         </p:nvSpPr>
         <p:spPr>
           <a:xfrm>
-            <a:off x="6605455" y="755171"/>
-            <a:ext cx="4619937" cy="5315035"/>
+            <a:off x="838199" y="2657316"/>
+            <a:ext cx="10700657" cy="3369858"/>
+          </a:xfrm>
+          <a:noFill/>
+        </p:spPr>
+        <p:txBody>
+          <a:bodyPr vert="horz" lIns="91440" tIns="45720" rIns="91440" bIns="45720" rtlCol="0" anchor="t">
+            <a:normAutofit/>
+          </a:bodyPr>
+          <a:lstStyle/>
+          <a:p>
+            <a:r>
+              <a:rPr lang="en-US" sz="2800" dirty="0"/>
+              <a:t>As React Provided us with option to create custom hooks, this gave developers chance to create useful hooks and using other libraries with means of custom react hooks for react.</a:t>
+            </a:r>
+          </a:p>
+          <a:p>
+            <a:endParaRPr lang="en-US" sz="2800" dirty="0"/>
+          </a:p>
+        </p:txBody>
+      </p:sp>
+    </p:spTree>
+    <p:extLst>
+      <p:ext uri="{BB962C8B-B14F-4D97-AF65-F5344CB8AC3E}">
+        <p14:creationId xmlns:p14="http://schemas.microsoft.com/office/powerpoint/2010/main" val="143738769"/>
+      </p:ext>
+    </p:extLst>
+  </p:cSld>
+  <p:clrMapOvr>
+    <a:masterClrMapping/>
+  </p:clrMapOvr>
+</p:sld>
+</file>
+
+<file path=ppt/slides/slide17.xml><?xml version="1.0" encoding="utf-8"?>
+<p:sld xmlns:a="http://schemas.openxmlformats.org/drawingml/2006/main" xmlns:r="http://schemas.openxmlformats.org/officeDocument/2006/relationships" xmlns:p="http://schemas.openxmlformats.org/presentationml/2006/main">
+  <p:cSld>
+    <p:spTree>
+      <p:nvGrpSpPr>
+        <p:cNvPr id="1" name="">
+          <a:extLst>
+            <a:ext uri="{FF2B5EF4-FFF2-40B4-BE49-F238E27FC236}">
+              <a16:creationId xmlns:a16="http://schemas.microsoft.com/office/drawing/2014/main" id="{A7DBAEB0-7E65-87D2-82EF-A24018F8C577}"/>
+            </a:ext>
+          </a:extLst>
+        </p:cNvPr>
+        <p:cNvGrpSpPr/>
+        <p:nvPr/>
+      </p:nvGrpSpPr>
+      <p:grpSpPr>
+        <a:xfrm>
+          <a:off x="0" y="0"/>
+          <a:ext cx="0" cy="0"/>
+          <a:chOff x="0" y="0"/>
+          <a:chExt cx="0" cy="0"/>
+        </a:xfrm>
+      </p:grpSpPr>
+      <p:sp>
+        <p:nvSpPr>
+          <p:cNvPr id="2" name="Title 1">
+            <a:extLst>
+              <a:ext uri="{FF2B5EF4-FFF2-40B4-BE49-F238E27FC236}">
+                <a16:creationId xmlns:a16="http://schemas.microsoft.com/office/drawing/2014/main" id="{0B254293-7683-DF8B-FE59-BF7E92D3B6DA}"/>
+              </a:ext>
+            </a:extLst>
+          </p:cNvPr>
+          <p:cNvSpPr>
+            <a:spLocks noGrp="1"/>
+          </p:cNvSpPr>
+          <p:nvPr>
+            <p:ph type="title"/>
+          </p:nvPr>
+        </p:nvSpPr>
+        <p:spPr>
+          <a:xfrm>
+            <a:off x="838200" y="365125"/>
+            <a:ext cx="10515600" cy="1325563"/>
+          </a:xfrm>
+          <a:noFill/>
+        </p:spPr>
+        <p:txBody>
+          <a:bodyPr anchor="ctr"/>
+          <a:lstStyle/>
+          <a:p>
+            <a:r>
+              <a:rPr lang="en-US" sz="3600" dirty="0"/>
+              <a:t>Third-party libraries which provide hooks</a:t>
+            </a:r>
+          </a:p>
+        </p:txBody>
+      </p:sp>
+      <p:sp>
+        <p:nvSpPr>
+          <p:cNvPr id="3" name="Content Placeholder 2">
+            <a:extLst>
+              <a:ext uri="{FF2B5EF4-FFF2-40B4-BE49-F238E27FC236}">
+                <a16:creationId xmlns:a16="http://schemas.microsoft.com/office/drawing/2014/main" id="{AADF92E4-76E7-2F28-C487-9EAB2692F9F9}"/>
+              </a:ext>
+            </a:extLst>
+          </p:cNvPr>
+          <p:cNvSpPr>
+            <a:spLocks noGrp="1"/>
+          </p:cNvSpPr>
+          <p:nvPr>
+            <p:ph sz="half" idx="1"/>
+          </p:nvPr>
+        </p:nvSpPr>
+        <p:spPr>
+          <a:xfrm>
+            <a:off x="838201" y="1825625"/>
+            <a:ext cx="10337799" cy="4297680"/>
           </a:xfrm>
           <a:noFill/>
         </p:spPr>
@@ -14340,34 +14096,271 @@
           <a:lstStyle/>
           <a:p>
             <a:r>
-              <a:rPr lang="en-US" dirty="0"/>
-              <a:t>Om Patel</a:t>
-            </a:r>
-          </a:p>
-          <a:p>
-            <a:r>
-              <a:rPr lang="en-US" dirty="0"/>
-              <a:t>502-555-0152</a:t>
-            </a:r>
-          </a:p>
-          <a:p>
-            <a:r>
-              <a:rPr lang="en-US" dirty="0"/>
-              <a:t>brita@firstupconsultants.com</a:t>
-            </a:r>
-          </a:p>
-          <a:p>
-            <a:r>
-              <a:rPr lang="en-US" dirty="0"/>
-              <a:t>www.firstupconsultants.com</a:t>
-            </a:r>
+              <a:rPr lang="en-US" sz="2800" dirty="0"/>
+              <a:t>React recipes : library with lot of </a:t>
+            </a:r>
+            <a:r>
+              <a:rPr lang="en-GB" sz="2800" dirty="0"/>
+              <a:t>frequently used hooks</a:t>
+            </a:r>
+            <a:endParaRPr lang="en-US" sz="2800" dirty="0"/>
+          </a:p>
+          <a:p>
+            <a:r>
+              <a:rPr lang="en-US" sz="2800" dirty="0"/>
+              <a:t>Redux / Redux Toolkit : redux hooks and </a:t>
+            </a:r>
+            <a:r>
+              <a:rPr lang="en-US" sz="2800" dirty="0" err="1"/>
+              <a:t>api</a:t>
+            </a:r>
+            <a:r>
+              <a:rPr lang="en-US" sz="2800" dirty="0"/>
+              <a:t> provider</a:t>
+            </a:r>
+          </a:p>
+          <a:p>
+            <a:r>
+              <a:rPr lang="en-US" sz="2800" dirty="0"/>
+              <a:t>React hook forms : for handling library for react</a:t>
+            </a:r>
+          </a:p>
+          <a:p>
+            <a:r>
+              <a:rPr lang="en-US" sz="2800" dirty="0" err="1"/>
+              <a:t>useGSAP</a:t>
+            </a:r>
+            <a:r>
+              <a:rPr lang="en-US" sz="2800" dirty="0"/>
+              <a:t> : from </a:t>
+            </a:r>
+            <a:r>
+              <a:rPr lang="en-US" sz="2800" dirty="0" err="1"/>
+              <a:t>Greensock</a:t>
+            </a:r>
+            <a:r>
+              <a:rPr lang="en-US" sz="2800" dirty="0"/>
+              <a:t> animation </a:t>
+            </a:r>
+            <a:r>
+              <a:rPr lang="en-GB" sz="2800" dirty="0"/>
+              <a:t>library</a:t>
+            </a:r>
+            <a:r>
+              <a:rPr lang="en-US" sz="2800" dirty="0"/>
+              <a:t>.</a:t>
+            </a:r>
+          </a:p>
+          <a:p>
+            <a:r>
+              <a:rPr lang="en-US" sz="2800" dirty="0" err="1"/>
+              <a:t>Formik</a:t>
+            </a:r>
+            <a:r>
+              <a:rPr lang="en-US" sz="2800" dirty="0"/>
+              <a:t> :  another form handling </a:t>
+            </a:r>
+            <a:r>
+              <a:rPr lang="en-GB" sz="2800" dirty="0"/>
+              <a:t>library</a:t>
+            </a:r>
+          </a:p>
+          <a:p>
+            <a:r>
+              <a:rPr lang="en-GB" sz="2800" dirty="0" err="1"/>
+              <a:t>useAnimate</a:t>
+            </a:r>
+            <a:r>
+              <a:rPr lang="en-GB" sz="2800" dirty="0"/>
+              <a:t> : from Framer motion</a:t>
+            </a:r>
+          </a:p>
+          <a:p>
+            <a:r>
+              <a:rPr lang="en-GB" sz="2800" dirty="0" err="1"/>
+              <a:t>usePortal</a:t>
+            </a:r>
+            <a:r>
+              <a:rPr lang="en-GB" sz="2800" dirty="0"/>
+              <a:t> : from </a:t>
+            </a:r>
+            <a:r>
+              <a:rPr lang="en-GB" sz="2800" dirty="0" err="1"/>
+              <a:t>UsePortal</a:t>
+            </a:r>
+            <a:r>
+              <a:rPr lang="en-GB" sz="2800" dirty="0"/>
+              <a:t> library</a:t>
+            </a:r>
+          </a:p>
+          <a:p>
+            <a:endParaRPr lang="en-US" sz="2800" dirty="0"/>
+          </a:p>
+          <a:p>
+            <a:endParaRPr lang="en-US" sz="3200" dirty="0"/>
+          </a:p>
+          <a:p>
+            <a:endParaRPr lang="en-US" sz="3200" dirty="0"/>
+          </a:p>
+          <a:p>
+            <a:endParaRPr lang="en-US" sz="3200" dirty="0"/>
+          </a:p>
+          <a:p>
+            <a:endParaRPr lang="en-US" sz="3200" dirty="0"/>
+          </a:p>
+          <a:p>
+            <a:endParaRPr lang="en-US" sz="3200" dirty="0"/>
           </a:p>
         </p:txBody>
       </p:sp>
     </p:spTree>
     <p:extLst>
       <p:ext uri="{BB962C8B-B14F-4D97-AF65-F5344CB8AC3E}">
-        <p14:creationId xmlns:p14="http://schemas.microsoft.com/office/powerpoint/2010/main" val="1562484837"/>
+        <p14:creationId xmlns:p14="http://schemas.microsoft.com/office/powerpoint/2010/main" val="120961490"/>
+      </p:ext>
+    </p:extLst>
+  </p:cSld>
+  <p:clrMapOvr>
+    <a:masterClrMapping/>
+  </p:clrMapOvr>
+</p:sld>
+</file>
+
+<file path=ppt/slides/slide18.xml><?xml version="1.0" encoding="utf-8"?>
+<p:sld xmlns:a="http://schemas.openxmlformats.org/drawingml/2006/main" xmlns:r="http://schemas.openxmlformats.org/officeDocument/2006/relationships" xmlns:p="http://schemas.openxmlformats.org/presentationml/2006/main">
+  <p:cSld>
+    <p:spTree>
+      <p:nvGrpSpPr>
+        <p:cNvPr id="1" name="">
+          <a:extLst>
+            <a:ext uri="{FF2B5EF4-FFF2-40B4-BE49-F238E27FC236}">
+              <a16:creationId xmlns:a16="http://schemas.microsoft.com/office/drawing/2014/main" id="{758D736D-2C55-FE1C-EFC2-9A3116B4BB0A}"/>
+            </a:ext>
+          </a:extLst>
+        </p:cNvPr>
+        <p:cNvGrpSpPr/>
+        <p:nvPr/>
+      </p:nvGrpSpPr>
+      <p:grpSpPr>
+        <a:xfrm>
+          <a:off x="0" y="0"/>
+          <a:ext cx="0" cy="0"/>
+          <a:chOff x="0" y="0"/>
+          <a:chExt cx="0" cy="0"/>
+        </a:xfrm>
+      </p:grpSpPr>
+      <p:sp>
+        <p:nvSpPr>
+          <p:cNvPr id="2" name="Title 1">
+            <a:extLst>
+              <a:ext uri="{FF2B5EF4-FFF2-40B4-BE49-F238E27FC236}">
+                <a16:creationId xmlns:a16="http://schemas.microsoft.com/office/drawing/2014/main" id="{B6728007-3102-9C41-A251-5BC940D39832}"/>
+              </a:ext>
+            </a:extLst>
+          </p:cNvPr>
+          <p:cNvSpPr>
+            <a:spLocks noGrp="1"/>
+          </p:cNvSpPr>
+          <p:nvPr>
+            <p:ph type="ctrTitle"/>
+          </p:nvPr>
+        </p:nvSpPr>
+        <p:spPr>
+          <a:xfrm>
+            <a:off x="2815929" y="1897425"/>
+            <a:ext cx="6560142" cy="3063149"/>
+          </a:xfrm>
+          <a:noFill/>
+        </p:spPr>
+        <p:txBody>
+          <a:bodyPr/>
+          <a:lstStyle/>
+          <a:p>
+            <a:r>
+              <a:rPr lang="en-US" sz="8000" dirty="0"/>
+              <a:t>Summary</a:t>
+            </a:r>
+          </a:p>
+        </p:txBody>
+      </p:sp>
+    </p:spTree>
+    <p:extLst>
+      <p:ext uri="{BB962C8B-B14F-4D97-AF65-F5344CB8AC3E}">
+        <p14:creationId xmlns:p14="http://schemas.microsoft.com/office/powerpoint/2010/main" val="2962497592"/>
+      </p:ext>
+    </p:extLst>
+  </p:cSld>
+  <p:clrMapOvr>
+    <a:masterClrMapping/>
+  </p:clrMapOvr>
+</p:sld>
+</file>
+
+<file path=ppt/slides/slide19.xml><?xml version="1.0" encoding="utf-8"?>
+<p:sld xmlns:a="http://schemas.openxmlformats.org/drawingml/2006/main" xmlns:r="http://schemas.openxmlformats.org/officeDocument/2006/relationships" xmlns:p="http://schemas.openxmlformats.org/presentationml/2006/main">
+  <p:cSld>
+    <p:spTree>
+      <p:nvGrpSpPr>
+        <p:cNvPr id="1" name="">
+          <a:extLst>
+            <a:ext uri="{FF2B5EF4-FFF2-40B4-BE49-F238E27FC236}">
+              <a16:creationId xmlns:a16="http://schemas.microsoft.com/office/drawing/2014/main" id="{CD61B31B-8216-07A5-503E-E67B523DB12A}"/>
+            </a:ext>
+          </a:extLst>
+        </p:cNvPr>
+        <p:cNvGrpSpPr/>
+        <p:nvPr/>
+      </p:nvGrpSpPr>
+      <p:grpSpPr>
+        <a:xfrm>
+          <a:off x="0" y="0"/>
+          <a:ext cx="0" cy="0"/>
+          <a:chOff x="0" y="0"/>
+          <a:chExt cx="0" cy="0"/>
+        </a:xfrm>
+      </p:grpSpPr>
+      <p:sp>
+        <p:nvSpPr>
+          <p:cNvPr id="2" name="Title 1">
+            <a:extLst>
+              <a:ext uri="{FF2B5EF4-FFF2-40B4-BE49-F238E27FC236}">
+                <a16:creationId xmlns:a16="http://schemas.microsoft.com/office/drawing/2014/main" id="{E485302A-0554-B5B6-B2EB-B4B76B760244}"/>
+              </a:ext>
+            </a:extLst>
+          </p:cNvPr>
+          <p:cNvSpPr>
+            <a:spLocks noGrp="1"/>
+          </p:cNvSpPr>
+          <p:nvPr>
+            <p:ph type="ctrTitle"/>
+          </p:nvPr>
+        </p:nvSpPr>
+        <p:spPr>
+          <a:xfrm>
+            <a:off x="2815929" y="1897425"/>
+            <a:ext cx="6560142" cy="3063149"/>
+          </a:xfrm>
+          <a:noFill/>
+        </p:spPr>
+        <p:txBody>
+          <a:bodyPr/>
+          <a:lstStyle/>
+          <a:p>
+            <a:r>
+              <a:rPr lang="en-US" sz="8000" dirty="0" err="1"/>
+              <a:t>thankYou</a:t>
+            </a:r>
+            <a:r>
+              <a:rPr lang="en-US" sz="8000" dirty="0"/>
+              <a:t>();</a:t>
+            </a:r>
+          </a:p>
+        </p:txBody>
+      </p:sp>
+    </p:spTree>
+    <p:extLst>
+      <p:ext uri="{BB962C8B-B14F-4D97-AF65-F5344CB8AC3E}">
+        <p14:creationId xmlns:p14="http://schemas.microsoft.com/office/powerpoint/2010/main" val="890336254"/>
       </p:ext>
     </p:extLst>
   </p:cSld>
@@ -16230,15 +16223,6 @@
 </file>
 
 <file path=customXml/item1.xml><?xml version="1.0" encoding="utf-8"?>
-<?mso-contentType ?>
-<FormTemplates xmlns="http://schemas.microsoft.com/sharepoint/v3/contenttype/forms">
-  <Display>DocumentLibraryForm</Display>
-  <Edit>DocumentLibraryForm</Edit>
-  <New>DocumentLibraryForm</New>
-</FormTemplates>
-</file>
-
-<file path=customXml/item2.xml><?xml version="1.0" encoding="utf-8"?>
 <p:properties xmlns:p="http://schemas.microsoft.com/office/2006/metadata/properties" xmlns:xsi="http://www.w3.org/2001/XMLSchema-instance" xmlns:pc="http://schemas.microsoft.com/office/infopath/2007/PartnerControls">
   <documentManagement>
     <_ip_UnifiedCompliancePolicyUIAction xmlns="http://schemas.microsoft.com/sharepoint/v3" xsi:nil="true"/>
@@ -16256,6 +16240,15 @@
     <MediaServiceKeyPoints xmlns="71af3243-3dd4-4a8d-8c0d-dd76da1f02a5" xsi:nil="true"/>
   </documentManagement>
 </p:properties>
+</file>
+
+<file path=customXml/item2.xml><?xml version="1.0" encoding="utf-8"?>
+<?mso-contentType ?>
+<FormTemplates xmlns="http://schemas.microsoft.com/sharepoint/v3/contenttype/forms">
+  <Display>DocumentLibraryForm</Display>
+  <Edit>DocumentLibraryForm</Edit>
+  <New>DocumentLibraryForm</New>
+</FormTemplates>
 </file>
 
 <file path=customXml/item3.xml><?xml version="1.0" encoding="utf-8"?>
@@ -16571,14 +16564,6 @@
 </file>
 
 <file path=customXml/itemProps1.xml><?xml version="1.0" encoding="utf-8"?>
-<ds:datastoreItem xmlns:ds="http://schemas.openxmlformats.org/officeDocument/2006/customXml" ds:itemID="{4E60708A-6461-4D7F-883F-7E25D731D326}">
-  <ds:schemaRefs>
-    <ds:schemaRef ds:uri="http://schemas.microsoft.com/sharepoint/v3/contenttype/forms"/>
-  </ds:schemaRefs>
-</ds:datastoreItem>
-</file>
-
-<file path=customXml/itemProps2.xml><?xml version="1.0" encoding="utf-8"?>
 <ds:datastoreItem xmlns:ds="http://schemas.openxmlformats.org/officeDocument/2006/customXml" ds:itemID="{E130005B-6102-4F3C-A26F-485DF1BF9717}">
   <ds:schemaRefs>
     <ds:schemaRef ds:uri="http://schemas.microsoft.com/office/2006/metadata/properties"/>
@@ -16586,6 +16571,14 @@
     <ds:schemaRef ds:uri="http://schemas.microsoft.com/sharepoint/v3"/>
     <ds:schemaRef ds:uri="71af3243-3dd4-4a8d-8c0d-dd76da1f02a5"/>
     <ds:schemaRef ds:uri="230e9df3-be65-4c73-a93b-d1236ebd677e"/>
+  </ds:schemaRefs>
+</ds:datastoreItem>
+</file>
+
+<file path=customXml/itemProps2.xml><?xml version="1.0" encoding="utf-8"?>
+<ds:datastoreItem xmlns:ds="http://schemas.openxmlformats.org/officeDocument/2006/customXml" ds:itemID="{4E60708A-6461-4D7F-883F-7E25D731D326}">
+  <ds:schemaRefs>
+    <ds:schemaRef ds:uri="http://schemas.microsoft.com/sharepoint/v3/contenttype/forms"/>
   </ds:schemaRefs>
 </ds:datastoreItem>
 </file>

</xml_diff>